<commit_message>
Update for thesis submission
</commit_message>
<xml_diff>
--- a/Figures/bigscatterfigurewlegend.pptx
+++ b/Figures/bigscatterfigurewlegend.pptx
@@ -5,11 +5,17 @@
     <p:sldMasterId id="2147483648" r:id="rId1"/>
   </p:sldMasterIdLst>
   <p:notesMasterIdLst>
-    <p:notesMasterId r:id="rId4"/>
+    <p:notesMasterId r:id="rId10"/>
   </p:notesMasterIdLst>
   <p:sldIdLst>
     <p:sldId id="256" r:id="rId2"/>
     <p:sldId id="257" r:id="rId3"/>
+    <p:sldId id="258" r:id="rId4"/>
+    <p:sldId id="259" r:id="rId5"/>
+    <p:sldId id="260" r:id="rId6"/>
+    <p:sldId id="261" r:id="rId7"/>
+    <p:sldId id="262" r:id="rId8"/>
+    <p:sldId id="263" r:id="rId9"/>
   </p:sldIdLst>
   <p:sldSz cx="12192000" cy="6858000"/>
   <p:notesSz cx="6858000" cy="9144000"/>
@@ -198,7 +204,7 @@
           <a:p>
             <a:fld id="{329F1EF9-E4D3-0842-AB3E-594B1CCD105E}" type="datetimeFigureOut">
               <a:rPr lang="en-US" smtClean="0"/>
-              <a:t>10/5/23</a:t>
+              <a:t>11/17/23</a:t>
             </a:fld>
             <a:endParaRPr lang="en-US"/>
           </a:p>
@@ -550,6 +556,90 @@
 </p:notes>
 </file>
 
+<file path=ppt/notesSlides/notesSlide2.xml><?xml version="1.0" encoding="utf-8"?>
+<p:notes xmlns:a="http://schemas.openxmlformats.org/drawingml/2006/main" xmlns:r="http://schemas.openxmlformats.org/officeDocument/2006/relationships" xmlns:p="http://schemas.openxmlformats.org/presentationml/2006/main">
+  <p:cSld>
+    <p:spTree>
+      <p:nvGrpSpPr>
+        <p:cNvPr id="1" name=""/>
+        <p:cNvGrpSpPr/>
+        <p:nvPr/>
+      </p:nvGrpSpPr>
+      <p:grpSpPr>
+        <a:xfrm>
+          <a:off x="0" y="0"/>
+          <a:ext cx="0" cy="0"/>
+          <a:chOff x="0" y="0"/>
+          <a:chExt cx="0" cy="0"/>
+        </a:xfrm>
+      </p:grpSpPr>
+      <p:sp>
+        <p:nvSpPr>
+          <p:cNvPr id="2" name="Slide Image Placeholder 1"/>
+          <p:cNvSpPr>
+            <a:spLocks noGrp="1" noRot="1" noChangeAspect="1"/>
+          </p:cNvSpPr>
+          <p:nvPr>
+            <p:ph type="sldImg"/>
+          </p:nvPr>
+        </p:nvSpPr>
+        <p:spPr/>
+      </p:sp>
+      <p:sp>
+        <p:nvSpPr>
+          <p:cNvPr id="3" name="Notes Placeholder 2"/>
+          <p:cNvSpPr>
+            <a:spLocks noGrp="1"/>
+          </p:cNvSpPr>
+          <p:nvPr>
+            <p:ph type="body" idx="1"/>
+          </p:nvPr>
+        </p:nvSpPr>
+        <p:spPr/>
+        <p:txBody>
+          <a:bodyPr/>
+          <a:lstStyle/>
+          <a:p>
+            <a:endParaRPr lang="en-US" dirty="0"/>
+          </a:p>
+        </p:txBody>
+      </p:sp>
+      <p:sp>
+        <p:nvSpPr>
+          <p:cNvPr id="4" name="Slide Number Placeholder 3"/>
+          <p:cNvSpPr>
+            <a:spLocks noGrp="1"/>
+          </p:cNvSpPr>
+          <p:nvPr>
+            <p:ph type="sldNum" sz="quarter" idx="5"/>
+          </p:nvPr>
+        </p:nvSpPr>
+        <p:spPr/>
+        <p:txBody>
+          <a:bodyPr/>
+          <a:lstStyle/>
+          <a:p>
+            <a:fld id="{D6DF28A1-3CCB-DB41-B49E-D7E2A39B8D7A}" type="slidenum">
+              <a:rPr lang="en-US" smtClean="0"/>
+              <a:t>3</a:t>
+            </a:fld>
+            <a:endParaRPr lang="en-US"/>
+          </a:p>
+        </p:txBody>
+      </p:sp>
+    </p:spTree>
+    <p:extLst>
+      <p:ext uri="{BB962C8B-B14F-4D97-AF65-F5344CB8AC3E}">
+        <p14:creationId xmlns:p14="http://schemas.microsoft.com/office/powerpoint/2010/main" val="1351832299"/>
+      </p:ext>
+    </p:extLst>
+  </p:cSld>
+  <p:clrMapOvr>
+    <a:masterClrMapping/>
+  </p:clrMapOvr>
+</p:notes>
+</file>
+
 <file path=ppt/slideLayouts/slideLayout1.xml><?xml version="1.0" encoding="utf-8"?>
 <p:sldLayout xmlns:a="http://schemas.openxmlformats.org/drawingml/2006/main" xmlns:r="http://schemas.openxmlformats.org/officeDocument/2006/relationships" xmlns:p="http://schemas.openxmlformats.org/presentationml/2006/main" type="title" preserve="1">
   <p:cSld name="Title Slide">
@@ -699,7 +789,7 @@
           <a:p>
             <a:fld id="{FC33EB38-C285-A243-8651-580919D55E22}" type="datetimeFigureOut">
               <a:rPr lang="en-US" smtClean="0"/>
-              <a:t>10/5/23</a:t>
+              <a:t>11/17/23</a:t>
             </a:fld>
             <a:endParaRPr lang="en-US"/>
           </a:p>
@@ -899,7 +989,7 @@
           <a:p>
             <a:fld id="{FC33EB38-C285-A243-8651-580919D55E22}" type="datetimeFigureOut">
               <a:rPr lang="en-US" smtClean="0"/>
-              <a:t>10/5/23</a:t>
+              <a:t>11/17/23</a:t>
             </a:fld>
             <a:endParaRPr lang="en-US"/>
           </a:p>
@@ -1109,7 +1199,7 @@
           <a:p>
             <a:fld id="{FC33EB38-C285-A243-8651-580919D55E22}" type="datetimeFigureOut">
               <a:rPr lang="en-US" smtClean="0"/>
-              <a:t>10/5/23</a:t>
+              <a:t>11/17/23</a:t>
             </a:fld>
             <a:endParaRPr lang="en-US"/>
           </a:p>
@@ -1309,7 +1399,7 @@
           <a:p>
             <a:fld id="{FC33EB38-C285-A243-8651-580919D55E22}" type="datetimeFigureOut">
               <a:rPr lang="en-US" smtClean="0"/>
-              <a:t>10/5/23</a:t>
+              <a:t>11/17/23</a:t>
             </a:fld>
             <a:endParaRPr lang="en-US"/>
           </a:p>
@@ -1585,7 +1675,7 @@
           <a:p>
             <a:fld id="{FC33EB38-C285-A243-8651-580919D55E22}" type="datetimeFigureOut">
               <a:rPr lang="en-US" smtClean="0"/>
-              <a:t>10/5/23</a:t>
+              <a:t>11/17/23</a:t>
             </a:fld>
             <a:endParaRPr lang="en-US"/>
           </a:p>
@@ -1853,7 +1943,7 @@
           <a:p>
             <a:fld id="{FC33EB38-C285-A243-8651-580919D55E22}" type="datetimeFigureOut">
               <a:rPr lang="en-US" smtClean="0"/>
-              <a:t>10/5/23</a:t>
+              <a:t>11/17/23</a:t>
             </a:fld>
             <a:endParaRPr lang="en-US"/>
           </a:p>
@@ -2268,7 +2358,7 @@
           <a:p>
             <a:fld id="{FC33EB38-C285-A243-8651-580919D55E22}" type="datetimeFigureOut">
               <a:rPr lang="en-US" smtClean="0"/>
-              <a:t>10/5/23</a:t>
+              <a:t>11/17/23</a:t>
             </a:fld>
             <a:endParaRPr lang="en-US"/>
           </a:p>
@@ -2410,7 +2500,7 @@
           <a:p>
             <a:fld id="{FC33EB38-C285-A243-8651-580919D55E22}" type="datetimeFigureOut">
               <a:rPr lang="en-US" smtClean="0"/>
-              <a:t>10/5/23</a:t>
+              <a:t>11/17/23</a:t>
             </a:fld>
             <a:endParaRPr lang="en-US"/>
           </a:p>
@@ -2523,7 +2613,7 @@
           <a:p>
             <a:fld id="{FC33EB38-C285-A243-8651-580919D55E22}" type="datetimeFigureOut">
               <a:rPr lang="en-US" smtClean="0"/>
-              <a:t>10/5/23</a:t>
+              <a:t>11/17/23</a:t>
             </a:fld>
             <a:endParaRPr lang="en-US"/>
           </a:p>
@@ -2836,7 +2926,7 @@
           <a:p>
             <a:fld id="{FC33EB38-C285-A243-8651-580919D55E22}" type="datetimeFigureOut">
               <a:rPr lang="en-US" smtClean="0"/>
-              <a:t>10/5/23</a:t>
+              <a:t>11/17/23</a:t>
             </a:fld>
             <a:endParaRPr lang="en-US"/>
           </a:p>
@@ -3125,7 +3215,7 @@
           <a:p>
             <a:fld id="{FC33EB38-C285-A243-8651-580919D55E22}" type="datetimeFigureOut">
               <a:rPr lang="en-US" smtClean="0"/>
-              <a:t>10/5/23</a:t>
+              <a:t>11/17/23</a:t>
             </a:fld>
             <a:endParaRPr lang="en-US"/>
           </a:p>
@@ -3368,7 +3458,7 @@
           <a:p>
             <a:fld id="{FC33EB38-C285-A243-8651-580919D55E22}" type="datetimeFigureOut">
               <a:rPr lang="en-US" smtClean="0"/>
-              <a:t>10/5/23</a:t>
+              <a:t>11/17/23</a:t>
             </a:fld>
             <a:endParaRPr lang="en-US"/>
           </a:p>
@@ -4463,10 +4553,2460 @@
           <a:chExt cx="0" cy="0"/>
         </a:xfrm>
       </p:grpSpPr>
+      <p:grpSp>
+        <p:nvGrpSpPr>
+          <p:cNvPr id="16" name="Group 15">
+            <a:extLst>
+              <a:ext uri="{FF2B5EF4-FFF2-40B4-BE49-F238E27FC236}">
+                <a16:creationId xmlns:a16="http://schemas.microsoft.com/office/drawing/2014/main" id="{33F5D9AE-1B77-FC2D-962B-0E1E6A84A63D}"/>
+              </a:ext>
+            </a:extLst>
+          </p:cNvPr>
+          <p:cNvGrpSpPr/>
+          <p:nvPr/>
+        </p:nvGrpSpPr>
+        <p:grpSpPr>
+          <a:xfrm>
+            <a:off x="3328983" y="139338"/>
+            <a:ext cx="6083870" cy="6579324"/>
+            <a:chOff x="3320274" y="139338"/>
+            <a:chExt cx="6083870" cy="6579324"/>
+          </a:xfrm>
+        </p:grpSpPr>
+        <p:grpSp>
+          <p:nvGrpSpPr>
+            <p:cNvPr id="14" name="Group 13">
+              <a:extLst>
+                <a:ext uri="{FF2B5EF4-FFF2-40B4-BE49-F238E27FC236}">
+                  <a16:creationId xmlns:a16="http://schemas.microsoft.com/office/drawing/2014/main" id="{CEE1A301-05C4-D396-4F85-CC8ED6652DB6}"/>
+                </a:ext>
+              </a:extLst>
+            </p:cNvPr>
+            <p:cNvGrpSpPr/>
+            <p:nvPr/>
+          </p:nvGrpSpPr>
+          <p:grpSpPr>
+            <a:xfrm>
+              <a:off x="3320274" y="139338"/>
+              <a:ext cx="6083870" cy="6579324"/>
+              <a:chOff x="3320274" y="139338"/>
+              <a:chExt cx="6083870" cy="6579324"/>
+            </a:xfrm>
+          </p:grpSpPr>
+          <p:grpSp>
+            <p:nvGrpSpPr>
+              <p:cNvPr id="10" name="Group 9">
+                <a:extLst>
+                  <a:ext uri="{FF2B5EF4-FFF2-40B4-BE49-F238E27FC236}">
+                    <a16:creationId xmlns:a16="http://schemas.microsoft.com/office/drawing/2014/main" id="{3E0D2375-0BE3-9897-49B0-AFC709EAF992}"/>
+                  </a:ext>
+                </a:extLst>
+              </p:cNvPr>
+              <p:cNvGrpSpPr/>
+              <p:nvPr/>
+            </p:nvGrpSpPr>
+            <p:grpSpPr>
+              <a:xfrm>
+                <a:off x="3320274" y="607415"/>
+                <a:ext cx="5920114" cy="6111247"/>
+                <a:chOff x="3320274" y="607415"/>
+                <a:chExt cx="5920114" cy="6111247"/>
+              </a:xfrm>
+            </p:grpSpPr>
+            <p:pic>
+              <p:nvPicPr>
+                <p:cNvPr id="5" name="Picture 4" descr="A close-up of several graphs&#10;&#10;Description automatically generated">
+                  <a:extLst>
+                    <a:ext uri="{FF2B5EF4-FFF2-40B4-BE49-F238E27FC236}">
+                      <a16:creationId xmlns:a16="http://schemas.microsoft.com/office/drawing/2014/main" id="{76D14DBD-D348-7DFE-5043-308CF2BD93A5}"/>
+                    </a:ext>
+                  </a:extLst>
+                </p:cNvPr>
+                <p:cNvPicPr>
+                  <a:picLocks noChangeAspect="1"/>
+                </p:cNvPicPr>
+                <p:nvPr/>
+              </p:nvPicPr>
+              <p:blipFill rotWithShape="1">
+                <a:blip r:embed="rId2"/>
+                <a:srcRect r="88987" b="67941"/>
+                <a:stretch/>
+              </p:blipFill>
+              <p:spPr>
+                <a:xfrm>
+                  <a:off x="8553651" y="607415"/>
+                  <a:ext cx="686737" cy="1042297"/>
+                </a:xfrm>
+                <a:prstGeom prst="rect">
+                  <a:avLst/>
+                </a:prstGeom>
+              </p:spPr>
+            </p:pic>
+            <p:pic>
+              <p:nvPicPr>
+                <p:cNvPr id="7" name="Picture 6" descr="A close-up of several graphs&#10;&#10;Description automatically generated">
+                  <a:extLst>
+                    <a:ext uri="{FF2B5EF4-FFF2-40B4-BE49-F238E27FC236}">
+                      <a16:creationId xmlns:a16="http://schemas.microsoft.com/office/drawing/2014/main" id="{E89A8B68-24BF-C3D3-4BB0-F306C8762683}"/>
+                    </a:ext>
+                  </a:extLst>
+                </p:cNvPr>
+                <p:cNvPicPr>
+                  <a:picLocks noChangeAspect="1"/>
+                </p:cNvPicPr>
+                <p:nvPr/>
+              </p:nvPicPr>
+              <p:blipFill rotWithShape="1">
+                <a:blip r:embed="rId2"/>
+                <a:srcRect t="72083" r="91243" b="6643"/>
+                <a:stretch/>
+              </p:blipFill>
+              <p:spPr>
+                <a:xfrm>
+                  <a:off x="8534397" y="4862208"/>
+                  <a:ext cx="546059" cy="691662"/>
+                </a:xfrm>
+                <a:prstGeom prst="rect">
+                  <a:avLst/>
+                </a:prstGeom>
+              </p:spPr>
+            </p:pic>
+            <p:sp>
+              <p:nvSpPr>
+                <p:cNvPr id="8" name="TextBox 7">
+                  <a:extLst>
+                    <a:ext uri="{FF2B5EF4-FFF2-40B4-BE49-F238E27FC236}">
+                      <a16:creationId xmlns:a16="http://schemas.microsoft.com/office/drawing/2014/main" id="{8162708D-F6D7-3A71-08F8-B9F2826E840D}"/>
+                    </a:ext>
+                  </a:extLst>
+                </p:cNvPr>
+                <p:cNvSpPr txBox="1"/>
+                <p:nvPr/>
+              </p:nvSpPr>
+              <p:spPr>
+                <a:xfrm>
+                  <a:off x="5039948" y="6380108"/>
+                  <a:ext cx="2937753" cy="338554"/>
+                </a:xfrm>
+                <a:prstGeom prst="rect">
+                  <a:avLst/>
+                </a:prstGeom>
+                <a:noFill/>
+              </p:spPr>
+              <p:txBody>
+                <a:bodyPr wrap="square" rtlCol="0">
+                  <a:spAutoFit/>
+                </a:bodyPr>
+                <a:lstStyle/>
+                <a:p>
+                  <a:r>
+                    <a:rPr lang="en-US" sz="1600" dirty="0"/>
+                    <a:t>Absolute latitude (Degrees)</a:t>
+                  </a:r>
+                </a:p>
+              </p:txBody>
+            </p:sp>
+            <p:sp>
+              <p:nvSpPr>
+                <p:cNvPr id="9" name="TextBox 8">
+                  <a:extLst>
+                    <a:ext uri="{FF2B5EF4-FFF2-40B4-BE49-F238E27FC236}">
+                      <a16:creationId xmlns:a16="http://schemas.microsoft.com/office/drawing/2014/main" id="{22D831F1-C8E6-13EA-85BB-49428B376DBB}"/>
+                    </a:ext>
+                  </a:extLst>
+                </p:cNvPr>
+                <p:cNvSpPr txBox="1"/>
+                <p:nvPr/>
+              </p:nvSpPr>
+              <p:spPr>
+                <a:xfrm rot="16200000">
+                  <a:off x="2020674" y="2756440"/>
+                  <a:ext cx="2937753" cy="338554"/>
+                </a:xfrm>
+                <a:prstGeom prst="rect">
+                  <a:avLst/>
+                </a:prstGeom>
+                <a:noFill/>
+              </p:spPr>
+              <p:txBody>
+                <a:bodyPr wrap="square" rtlCol="0">
+                  <a:spAutoFit/>
+                </a:bodyPr>
+                <a:lstStyle/>
+                <a:p>
+                  <a:r>
+                    <a:rPr lang="en-US" sz="1600" dirty="0"/>
+                    <a:t>Mean temperature (</a:t>
+                  </a:r>
+                  <a:r>
+                    <a:rPr lang="en-AU" sz="1600" b="0" i="0" dirty="0">
+                      <a:solidFill>
+                        <a:srgbClr val="040C28"/>
+                      </a:solidFill>
+                      <a:effectLst/>
+                      <a:latin typeface="Google Sans"/>
+                    </a:rPr>
+                    <a:t>°C</a:t>
+                  </a:r>
+                  <a:r>
+                    <a:rPr lang="en-US" sz="1600" dirty="0"/>
+                    <a:t>)</a:t>
+                  </a:r>
+                </a:p>
+              </p:txBody>
+            </p:sp>
+          </p:grpSp>
+          <p:pic>
+            <p:nvPicPr>
+              <p:cNvPr id="3" name="Picture 2" descr="A close-up of a graph&#10;&#10;Description automatically generated">
+                <a:extLst>
+                  <a:ext uri="{FF2B5EF4-FFF2-40B4-BE49-F238E27FC236}">
+                    <a16:creationId xmlns:a16="http://schemas.microsoft.com/office/drawing/2014/main" id="{E8E44547-2422-B9C3-286F-F13E5CF3CA12}"/>
+                  </a:ext>
+                </a:extLst>
+              </p:cNvPr>
+              <p:cNvPicPr>
+                <a:picLocks noChangeAspect="1"/>
+              </p:cNvPicPr>
+              <p:nvPr/>
+            </p:nvPicPr>
+            <p:blipFill rotWithShape="1">
+              <a:blip r:embed="rId3"/>
+              <a:srcRect l="2795" t="-1035" r="-729" b="3210"/>
+              <a:stretch/>
+            </p:blipFill>
+            <p:spPr>
+              <a:xfrm>
+                <a:off x="3658828" y="139338"/>
+                <a:ext cx="4927823" cy="6240770"/>
+              </a:xfrm>
+              <a:prstGeom prst="rect">
+                <a:avLst/>
+              </a:prstGeom>
+            </p:spPr>
+          </p:pic>
+          <p:pic>
+            <p:nvPicPr>
+              <p:cNvPr id="11" name="Picture 10" descr="A graph of different colored lines&#10;&#10;Description automatically generated">
+                <a:extLst>
+                  <a:ext uri="{FF2B5EF4-FFF2-40B4-BE49-F238E27FC236}">
+                    <a16:creationId xmlns:a16="http://schemas.microsoft.com/office/drawing/2014/main" id="{3E77747C-B7A3-BDFB-5CD6-FB04EEBC5E99}"/>
+                  </a:ext>
+                </a:extLst>
+              </p:cNvPr>
+              <p:cNvPicPr>
+                <a:picLocks noChangeAspect="1"/>
+              </p:cNvPicPr>
+              <p:nvPr/>
+            </p:nvPicPr>
+            <p:blipFill rotWithShape="1">
+              <a:blip r:embed="rId4"/>
+              <a:srcRect l="80925" t="38622" b="36101"/>
+              <a:stretch/>
+            </p:blipFill>
+            <p:spPr>
+              <a:xfrm>
+                <a:off x="8551390" y="2846657"/>
+                <a:ext cx="852754" cy="818606"/>
+              </a:xfrm>
+              <a:prstGeom prst="rect">
+                <a:avLst/>
+              </a:prstGeom>
+            </p:spPr>
+          </p:pic>
+        </p:grpSp>
+        <p:pic>
+          <p:nvPicPr>
+            <p:cNvPr id="15" name="Picture 14" descr="A close-up of a graph&#10;&#10;Description automatically generated">
+              <a:extLst>
+                <a:ext uri="{FF2B5EF4-FFF2-40B4-BE49-F238E27FC236}">
+                  <a16:creationId xmlns:a16="http://schemas.microsoft.com/office/drawing/2014/main" id="{4D62E21E-0110-49EE-EA58-2E0DEC021519}"/>
+                </a:ext>
+              </a:extLst>
+            </p:cNvPr>
+            <p:cNvPicPr>
+              <a:picLocks noChangeAspect="1"/>
+            </p:cNvPicPr>
+            <p:nvPr/>
+          </p:nvPicPr>
+          <p:blipFill rotWithShape="1">
+            <a:blip r:embed="rId3"/>
+            <a:srcRect l="3530" t="32888" r="-729" b="34760"/>
+            <a:stretch/>
+          </p:blipFill>
+          <p:spPr>
+            <a:xfrm>
+              <a:off x="3621793" y="2223993"/>
+              <a:ext cx="4968000" cy="2171975"/>
+            </a:xfrm>
+            <a:prstGeom prst="rect">
+              <a:avLst/>
+            </a:prstGeom>
+          </p:spPr>
+        </p:pic>
+      </p:grpSp>
     </p:spTree>
     <p:extLst>
       <p:ext uri="{BB962C8B-B14F-4D97-AF65-F5344CB8AC3E}">
         <p14:creationId xmlns:p14="http://schemas.microsoft.com/office/powerpoint/2010/main" val="2105796871"/>
+      </p:ext>
+    </p:extLst>
+  </p:cSld>
+  <p:clrMapOvr>
+    <a:masterClrMapping/>
+  </p:clrMapOvr>
+</p:sld>
+</file>
+
+<file path=ppt/slides/slide3.xml><?xml version="1.0" encoding="utf-8"?>
+<p:sld xmlns:a="http://schemas.openxmlformats.org/drawingml/2006/main" xmlns:r="http://schemas.openxmlformats.org/officeDocument/2006/relationships" xmlns:p="http://schemas.openxmlformats.org/presentationml/2006/main">
+  <p:cSld>
+    <p:spTree>
+      <p:nvGrpSpPr>
+        <p:cNvPr id="1" name=""/>
+        <p:cNvGrpSpPr/>
+        <p:nvPr/>
+      </p:nvGrpSpPr>
+      <p:grpSpPr>
+        <a:xfrm>
+          <a:off x="0" y="0"/>
+          <a:ext cx="0" cy="0"/>
+          <a:chOff x="0" y="0"/>
+          <a:chExt cx="0" cy="0"/>
+        </a:xfrm>
+      </p:grpSpPr>
+      <p:grpSp>
+        <p:nvGrpSpPr>
+          <p:cNvPr id="2" name="Group 1">
+            <a:extLst>
+              <a:ext uri="{FF2B5EF4-FFF2-40B4-BE49-F238E27FC236}">
+                <a16:creationId xmlns:a16="http://schemas.microsoft.com/office/drawing/2014/main" id="{4383807F-20FA-671E-BAED-DA5E51DC9F2A}"/>
+              </a:ext>
+            </a:extLst>
+          </p:cNvPr>
+          <p:cNvGrpSpPr/>
+          <p:nvPr/>
+        </p:nvGrpSpPr>
+        <p:grpSpPr>
+          <a:xfrm>
+            <a:off x="3221769" y="134764"/>
+            <a:ext cx="6209614" cy="6577260"/>
+            <a:chOff x="3221769" y="134764"/>
+            <a:chExt cx="6209614" cy="6577260"/>
+          </a:xfrm>
+        </p:grpSpPr>
+        <p:grpSp>
+          <p:nvGrpSpPr>
+            <p:cNvPr id="14" name="Group 13">
+              <a:extLst>
+                <a:ext uri="{FF2B5EF4-FFF2-40B4-BE49-F238E27FC236}">
+                  <a16:creationId xmlns:a16="http://schemas.microsoft.com/office/drawing/2014/main" id="{4948AB46-7163-8A9D-D7AC-DAE3448B753C}"/>
+                </a:ext>
+              </a:extLst>
+            </p:cNvPr>
+            <p:cNvGrpSpPr/>
+            <p:nvPr/>
+          </p:nvGrpSpPr>
+          <p:grpSpPr>
+            <a:xfrm>
+              <a:off x="3221769" y="424715"/>
+              <a:ext cx="6001722" cy="6287309"/>
+              <a:chOff x="3241225" y="424715"/>
+              <a:chExt cx="6001722" cy="6287309"/>
+            </a:xfrm>
+          </p:grpSpPr>
+          <p:sp>
+            <p:nvSpPr>
+              <p:cNvPr id="9" name="TextBox 8">
+                <a:extLst>
+                  <a:ext uri="{FF2B5EF4-FFF2-40B4-BE49-F238E27FC236}">
+                    <a16:creationId xmlns:a16="http://schemas.microsoft.com/office/drawing/2014/main" id="{950DF742-F902-B23B-E765-2BB4AA902E52}"/>
+                  </a:ext>
+                </a:extLst>
+              </p:cNvPr>
+              <p:cNvSpPr txBox="1"/>
+              <p:nvPr/>
+            </p:nvSpPr>
+            <p:spPr>
+              <a:xfrm>
+                <a:off x="4889770" y="6373470"/>
+                <a:ext cx="2937753" cy="338554"/>
+              </a:xfrm>
+              <a:prstGeom prst="rect">
+                <a:avLst/>
+              </a:prstGeom>
+              <a:noFill/>
+            </p:spPr>
+            <p:txBody>
+              <a:bodyPr wrap="square" rtlCol="0">
+                <a:spAutoFit/>
+              </a:bodyPr>
+              <a:lstStyle/>
+              <a:p>
+                <a:r>
+                  <a:rPr lang="en-US" sz="1600" dirty="0"/>
+                  <a:t>Absolute latitude (Degrees)</a:t>
+                </a:r>
+              </a:p>
+            </p:txBody>
+          </p:sp>
+          <p:grpSp>
+            <p:nvGrpSpPr>
+              <p:cNvPr id="13" name="Group 12">
+                <a:extLst>
+                  <a:ext uri="{FF2B5EF4-FFF2-40B4-BE49-F238E27FC236}">
+                    <a16:creationId xmlns:a16="http://schemas.microsoft.com/office/drawing/2014/main" id="{26CAFB1A-7C56-932F-80BD-AC57744F0B8C}"/>
+                  </a:ext>
+                </a:extLst>
+              </p:cNvPr>
+              <p:cNvGrpSpPr/>
+              <p:nvPr/>
+            </p:nvGrpSpPr>
+            <p:grpSpPr>
+              <a:xfrm>
+                <a:off x="3241225" y="424715"/>
+                <a:ext cx="6001722" cy="5294527"/>
+                <a:chOff x="3241225" y="424715"/>
+                <a:chExt cx="6001722" cy="5294527"/>
+              </a:xfrm>
+            </p:grpSpPr>
+            <p:pic>
+              <p:nvPicPr>
+                <p:cNvPr id="7" name="Picture 6" descr="A close-up of several graphs&#10;&#10;Description automatically generated">
+                  <a:extLst>
+                    <a:ext uri="{FF2B5EF4-FFF2-40B4-BE49-F238E27FC236}">
+                      <a16:creationId xmlns:a16="http://schemas.microsoft.com/office/drawing/2014/main" id="{E877FD12-6C9D-7F68-2857-16430226E7C2}"/>
+                    </a:ext>
+                  </a:extLst>
+                </p:cNvPr>
+                <p:cNvPicPr>
+                  <a:picLocks noChangeAspect="1"/>
+                </p:cNvPicPr>
+                <p:nvPr/>
+              </p:nvPicPr>
+              <p:blipFill rotWithShape="1">
+                <a:blip r:embed="rId3"/>
+                <a:srcRect r="88987" b="67941"/>
+                <a:stretch/>
+              </p:blipFill>
+              <p:spPr>
+                <a:xfrm>
+                  <a:off x="8326877" y="424715"/>
+                  <a:ext cx="916070" cy="1390369"/>
+                </a:xfrm>
+                <a:prstGeom prst="rect">
+                  <a:avLst/>
+                </a:prstGeom>
+              </p:spPr>
+            </p:pic>
+            <p:pic>
+              <p:nvPicPr>
+                <p:cNvPr id="8" name="Picture 7" descr="A close-up of several graphs&#10;&#10;Description automatically generated">
+                  <a:extLst>
+                    <a:ext uri="{FF2B5EF4-FFF2-40B4-BE49-F238E27FC236}">
+                      <a16:creationId xmlns:a16="http://schemas.microsoft.com/office/drawing/2014/main" id="{DC2D2162-B4FE-E63E-04BA-714A9FA75DDF}"/>
+                    </a:ext>
+                  </a:extLst>
+                </p:cNvPr>
+                <p:cNvPicPr>
+                  <a:picLocks noChangeAspect="1"/>
+                </p:cNvPicPr>
+                <p:nvPr/>
+              </p:nvPicPr>
+              <p:blipFill rotWithShape="1">
+                <a:blip r:embed="rId3"/>
+                <a:srcRect t="72083" r="91243" b="6643"/>
+                <a:stretch/>
+              </p:blipFill>
+              <p:spPr>
+                <a:xfrm>
+                  <a:off x="8326877" y="4796602"/>
+                  <a:ext cx="728413" cy="922640"/>
+                </a:xfrm>
+                <a:prstGeom prst="rect">
+                  <a:avLst/>
+                </a:prstGeom>
+              </p:spPr>
+            </p:pic>
+            <p:sp>
+              <p:nvSpPr>
+                <p:cNvPr id="10" name="TextBox 9">
+                  <a:extLst>
+                    <a:ext uri="{FF2B5EF4-FFF2-40B4-BE49-F238E27FC236}">
+                      <a16:creationId xmlns:a16="http://schemas.microsoft.com/office/drawing/2014/main" id="{392121DE-80E3-0DDF-F306-2FAD69FFF41E}"/>
+                    </a:ext>
+                  </a:extLst>
+                </p:cNvPr>
+                <p:cNvSpPr txBox="1"/>
+                <p:nvPr/>
+              </p:nvSpPr>
+              <p:spPr>
+                <a:xfrm rot="16200000">
+                  <a:off x="1304463" y="2521286"/>
+                  <a:ext cx="4212077" cy="338554"/>
+                </a:xfrm>
+                <a:prstGeom prst="rect">
+                  <a:avLst/>
+                </a:prstGeom>
+                <a:noFill/>
+              </p:spPr>
+              <p:txBody>
+                <a:bodyPr wrap="square" rtlCol="0">
+                  <a:spAutoFit/>
+                </a:bodyPr>
+                <a:lstStyle/>
+                <a:p>
+                  <a:r>
+                    <a:rPr lang="en-US" sz="1600" dirty="0"/>
+                    <a:t>Standard deviation among site (</a:t>
+                  </a:r>
+                  <a:r>
+                    <a:rPr lang="en-AU" sz="1600" b="0" i="0" dirty="0">
+                      <a:solidFill>
+                        <a:srgbClr val="040C28"/>
+                      </a:solidFill>
+                      <a:effectLst/>
+                      <a:latin typeface="Google Sans"/>
+                    </a:rPr>
+                    <a:t>°C</a:t>
+                  </a:r>
+                  <a:r>
+                    <a:rPr lang="en-US" sz="1600" dirty="0"/>
+                    <a:t>)</a:t>
+                  </a:r>
+                </a:p>
+              </p:txBody>
+            </p:sp>
+          </p:grpSp>
+        </p:grpSp>
+        <p:pic>
+          <p:nvPicPr>
+            <p:cNvPr id="3" name="Picture 2" descr="A graph of different colored lines&#10;&#10;Description automatically generated with medium confidence">
+              <a:extLst>
+                <a:ext uri="{FF2B5EF4-FFF2-40B4-BE49-F238E27FC236}">
+                  <a16:creationId xmlns:a16="http://schemas.microsoft.com/office/drawing/2014/main" id="{4AB46E44-3666-1B96-66F3-B5E50784AC15}"/>
+                </a:ext>
+              </a:extLst>
+            </p:cNvPr>
+            <p:cNvPicPr>
+              <a:picLocks noChangeAspect="1"/>
+            </p:cNvPicPr>
+            <p:nvPr/>
+          </p:nvPicPr>
+          <p:blipFill rotWithShape="1">
+            <a:blip r:embed="rId4"/>
+            <a:srcRect l="1309" t="-1014" r="1" b="2524"/>
+            <a:stretch/>
+          </p:blipFill>
+          <p:spPr>
+            <a:xfrm>
+              <a:off x="3492137" y="134764"/>
+              <a:ext cx="4815283" cy="6238706"/>
+            </a:xfrm>
+            <a:prstGeom prst="rect">
+              <a:avLst/>
+            </a:prstGeom>
+          </p:spPr>
+        </p:pic>
+        <p:pic>
+          <p:nvPicPr>
+            <p:cNvPr id="4" name="Picture 3" descr="A graph of different colored lines&#10;&#10;Description automatically generated">
+              <a:extLst>
+                <a:ext uri="{FF2B5EF4-FFF2-40B4-BE49-F238E27FC236}">
+                  <a16:creationId xmlns:a16="http://schemas.microsoft.com/office/drawing/2014/main" id="{2255BBCD-8821-4670-B2AF-8FCB569193F7}"/>
+                </a:ext>
+              </a:extLst>
+            </p:cNvPr>
+            <p:cNvPicPr>
+              <a:picLocks noChangeAspect="1"/>
+            </p:cNvPicPr>
+            <p:nvPr/>
+          </p:nvPicPr>
+          <p:blipFill rotWithShape="1">
+            <a:blip r:embed="rId5"/>
+            <a:srcRect l="80925" t="38622" b="36101"/>
+            <a:stretch/>
+          </p:blipFill>
+          <p:spPr>
+            <a:xfrm>
+              <a:off x="8307420" y="2731931"/>
+              <a:ext cx="1123963" cy="1078954"/>
+            </a:xfrm>
+            <a:prstGeom prst="rect">
+              <a:avLst/>
+            </a:prstGeom>
+          </p:spPr>
+        </p:pic>
+      </p:grpSp>
+    </p:spTree>
+    <p:extLst>
+      <p:ext uri="{BB962C8B-B14F-4D97-AF65-F5344CB8AC3E}">
+        <p14:creationId xmlns:p14="http://schemas.microsoft.com/office/powerpoint/2010/main" val="2417282373"/>
+      </p:ext>
+    </p:extLst>
+  </p:cSld>
+  <p:clrMapOvr>
+    <a:masterClrMapping/>
+  </p:clrMapOvr>
+</p:sld>
+</file>
+
+<file path=ppt/slides/slide4.xml><?xml version="1.0" encoding="utf-8"?>
+<p:sld xmlns:a="http://schemas.openxmlformats.org/drawingml/2006/main" xmlns:r="http://schemas.openxmlformats.org/officeDocument/2006/relationships" xmlns:p="http://schemas.openxmlformats.org/presentationml/2006/main">
+  <p:cSld>
+    <p:spTree>
+      <p:nvGrpSpPr>
+        <p:cNvPr id="1" name=""/>
+        <p:cNvGrpSpPr/>
+        <p:nvPr/>
+      </p:nvGrpSpPr>
+      <p:grpSpPr>
+        <a:xfrm>
+          <a:off x="0" y="0"/>
+          <a:ext cx="0" cy="0"/>
+          <a:chOff x="0" y="0"/>
+          <a:chExt cx="0" cy="0"/>
+        </a:xfrm>
+      </p:grpSpPr>
+      <p:grpSp>
+        <p:nvGrpSpPr>
+          <p:cNvPr id="16" name="Group 15">
+            <a:extLst>
+              <a:ext uri="{FF2B5EF4-FFF2-40B4-BE49-F238E27FC236}">
+                <a16:creationId xmlns:a16="http://schemas.microsoft.com/office/drawing/2014/main" id="{1B829C65-2D8E-62F4-0FE1-06C9BC745EE1}"/>
+              </a:ext>
+            </a:extLst>
+          </p:cNvPr>
+          <p:cNvGrpSpPr/>
+          <p:nvPr/>
+        </p:nvGrpSpPr>
+        <p:grpSpPr>
+          <a:xfrm>
+            <a:off x="1362407" y="445228"/>
+            <a:ext cx="8011437" cy="5356026"/>
+            <a:chOff x="1489016" y="881326"/>
+            <a:chExt cx="8011437" cy="5356026"/>
+          </a:xfrm>
+        </p:grpSpPr>
+        <p:grpSp>
+          <p:nvGrpSpPr>
+            <p:cNvPr id="15" name="Group 14">
+              <a:extLst>
+                <a:ext uri="{FF2B5EF4-FFF2-40B4-BE49-F238E27FC236}">
+                  <a16:creationId xmlns:a16="http://schemas.microsoft.com/office/drawing/2014/main" id="{B58FD83A-6AFA-F9E8-E9C9-51FD046E9F41}"/>
+                </a:ext>
+              </a:extLst>
+            </p:cNvPr>
+            <p:cNvGrpSpPr/>
+            <p:nvPr/>
+          </p:nvGrpSpPr>
+          <p:grpSpPr>
+            <a:xfrm>
+              <a:off x="1489016" y="881326"/>
+              <a:ext cx="8011437" cy="5356026"/>
+              <a:chOff x="1955944" y="658973"/>
+              <a:chExt cx="8011437" cy="5356026"/>
+            </a:xfrm>
+          </p:grpSpPr>
+          <p:grpSp>
+            <p:nvGrpSpPr>
+              <p:cNvPr id="14" name="Group 13">
+                <a:extLst>
+                  <a:ext uri="{FF2B5EF4-FFF2-40B4-BE49-F238E27FC236}">
+                    <a16:creationId xmlns:a16="http://schemas.microsoft.com/office/drawing/2014/main" id="{0825F27F-4C0A-49E7-BDF6-7D178676BA30}"/>
+                  </a:ext>
+                </a:extLst>
+              </p:cNvPr>
+              <p:cNvGrpSpPr/>
+              <p:nvPr/>
+            </p:nvGrpSpPr>
+            <p:grpSpPr>
+              <a:xfrm>
+                <a:off x="1955944" y="658973"/>
+                <a:ext cx="8004751" cy="5111510"/>
+                <a:chOff x="1984404" y="651229"/>
+                <a:chExt cx="8004751" cy="5111510"/>
+              </a:xfrm>
+            </p:grpSpPr>
+            <p:pic>
+              <p:nvPicPr>
+                <p:cNvPr id="4" name="Picture 3" descr="A diagram of different colors and sizes&#10;&#10;Description automatically generated with medium confidence">
+                  <a:extLst>
+                    <a:ext uri="{FF2B5EF4-FFF2-40B4-BE49-F238E27FC236}">
+                      <a16:creationId xmlns:a16="http://schemas.microsoft.com/office/drawing/2014/main" id="{CFFEDA20-FFB3-E5B2-A6D5-FE5DCD5BCE31}"/>
+                    </a:ext>
+                  </a:extLst>
+                </p:cNvPr>
+                <p:cNvPicPr>
+                  <a:picLocks noChangeAspect="1"/>
+                </p:cNvPicPr>
+                <p:nvPr/>
+              </p:nvPicPr>
+              <p:blipFill>
+                <a:blip r:embed="rId2">
+                  <a:extLst>
+                    <a:ext uri="{28A0092B-C50C-407E-A947-70E740481C1C}">
+                      <a14:useLocalDpi xmlns:a14="http://schemas.microsoft.com/office/drawing/2010/main" val="0"/>
+                    </a:ext>
+                  </a:extLst>
+                </a:blip>
+                <a:stretch>
+                  <a:fillRect/>
+                </a:stretch>
+              </p:blipFill>
+              <p:spPr>
+                <a:xfrm>
+                  <a:off x="2156128" y="865762"/>
+                  <a:ext cx="7833027" cy="4896977"/>
+                </a:xfrm>
+                <a:prstGeom prst="rect">
+                  <a:avLst/>
+                </a:prstGeom>
+                <a:ln>
+                  <a:noFill/>
+                </a:ln>
+              </p:spPr>
+            </p:pic>
+            <p:sp>
+              <p:nvSpPr>
+                <p:cNvPr id="9" name="TextBox 8">
+                  <a:extLst>
+                    <a:ext uri="{FF2B5EF4-FFF2-40B4-BE49-F238E27FC236}">
+                      <a16:creationId xmlns:a16="http://schemas.microsoft.com/office/drawing/2014/main" id="{DBCA855E-C526-CF7B-A72F-C9430E5E77C7}"/>
+                    </a:ext>
+                  </a:extLst>
+                </p:cNvPr>
+                <p:cNvSpPr txBox="1"/>
+                <p:nvPr/>
+              </p:nvSpPr>
+              <p:spPr>
+                <a:xfrm>
+                  <a:off x="4148850" y="864065"/>
+                  <a:ext cx="4697301" cy="338554"/>
+                </a:xfrm>
+                <a:prstGeom prst="rect">
+                  <a:avLst/>
+                </a:prstGeom>
+                <a:solidFill>
+                  <a:schemeClr val="bg1"/>
+                </a:solidFill>
+                <a:ln>
+                  <a:noFill/>
+                </a:ln>
+              </p:spPr>
+              <p:txBody>
+                <a:bodyPr wrap="square" rtlCol="0">
+                  <a:spAutoFit/>
+                </a:bodyPr>
+                <a:lstStyle/>
+                <a:p>
+                  <a:r>
+                    <a:rPr lang="en-US" sz="1600" dirty="0"/>
+                    <a:t>A.                  Ectotherms</a:t>
+                  </a:r>
+                </a:p>
+              </p:txBody>
+            </p:sp>
+            <p:sp>
+              <p:nvSpPr>
+                <p:cNvPr id="10" name="TextBox 9">
+                  <a:extLst>
+                    <a:ext uri="{FF2B5EF4-FFF2-40B4-BE49-F238E27FC236}">
+                      <a16:creationId xmlns:a16="http://schemas.microsoft.com/office/drawing/2014/main" id="{E727FFF6-50E0-BC45-5364-EA1EDADB7CC8}"/>
+                    </a:ext>
+                  </a:extLst>
+                </p:cNvPr>
+                <p:cNvSpPr txBox="1"/>
+                <p:nvPr/>
+              </p:nvSpPr>
+              <p:spPr>
+                <a:xfrm>
+                  <a:off x="1984404" y="4025484"/>
+                  <a:ext cx="1557488" cy="307777"/>
+                </a:xfrm>
+                <a:prstGeom prst="rect">
+                  <a:avLst/>
+                </a:prstGeom>
+                <a:solidFill>
+                  <a:schemeClr val="bg1"/>
+                </a:solidFill>
+                <a:ln>
+                  <a:noFill/>
+                </a:ln>
+              </p:spPr>
+              <p:txBody>
+                <a:bodyPr wrap="square" rtlCol="0">
+                  <a:spAutoFit/>
+                </a:bodyPr>
+                <a:lstStyle/>
+                <a:p>
+                  <a:r>
+                    <a:rPr lang="en-US" sz="1400" dirty="0"/>
+                    <a:t>B.    Invertebrates</a:t>
+                  </a:r>
+                </a:p>
+              </p:txBody>
+            </p:sp>
+            <p:sp>
+              <p:nvSpPr>
+                <p:cNvPr id="12" name="TextBox 11">
+                  <a:extLst>
+                    <a:ext uri="{FF2B5EF4-FFF2-40B4-BE49-F238E27FC236}">
+                      <a16:creationId xmlns:a16="http://schemas.microsoft.com/office/drawing/2014/main" id="{742BB06B-EAC9-BBA8-04F9-EA52CDA130FD}"/>
+                    </a:ext>
+                  </a:extLst>
+                </p:cNvPr>
+                <p:cNvSpPr txBox="1"/>
+                <p:nvPr/>
+              </p:nvSpPr>
+              <p:spPr>
+                <a:xfrm>
+                  <a:off x="7404639" y="4005740"/>
+                  <a:ext cx="2081239" cy="307777"/>
+                </a:xfrm>
+                <a:prstGeom prst="rect">
+                  <a:avLst/>
+                </a:prstGeom>
+                <a:solidFill>
+                  <a:schemeClr val="bg1"/>
+                </a:solidFill>
+                <a:ln>
+                  <a:noFill/>
+                </a:ln>
+              </p:spPr>
+              <p:txBody>
+                <a:bodyPr wrap="square" rtlCol="0">
+                  <a:spAutoFit/>
+                </a:bodyPr>
+                <a:lstStyle/>
+                <a:p>
+                  <a:r>
+                    <a:rPr lang="en-US" sz="1400" dirty="0"/>
+                    <a:t>D.   Sea Turtles</a:t>
+                  </a:r>
+                </a:p>
+              </p:txBody>
+            </p:sp>
+            <p:sp>
+              <p:nvSpPr>
+                <p:cNvPr id="13" name="Rectangle 12">
+                  <a:extLst>
+                    <a:ext uri="{FF2B5EF4-FFF2-40B4-BE49-F238E27FC236}">
+                      <a16:creationId xmlns:a16="http://schemas.microsoft.com/office/drawing/2014/main" id="{4480FE9F-ACBA-6C2A-0AB6-44FDEE4451B7}"/>
+                    </a:ext>
+                  </a:extLst>
+                </p:cNvPr>
+                <p:cNvSpPr/>
+                <p:nvPr/>
+              </p:nvSpPr>
+              <p:spPr>
+                <a:xfrm>
+                  <a:off x="1984404" y="651229"/>
+                  <a:ext cx="651753" cy="856034"/>
+                </a:xfrm>
+                <a:prstGeom prst="rect">
+                  <a:avLst/>
+                </a:prstGeom>
+                <a:solidFill>
+                  <a:schemeClr val="bg1"/>
+                </a:solidFill>
+                <a:ln>
+                  <a:noFill/>
+                </a:ln>
+              </p:spPr>
+              <p:style>
+                <a:lnRef idx="2">
+                  <a:schemeClr val="accent1">
+                    <a:shade val="15000"/>
+                  </a:schemeClr>
+                </a:lnRef>
+                <a:fillRef idx="1">
+                  <a:schemeClr val="accent1"/>
+                </a:fillRef>
+                <a:effectRef idx="0">
+                  <a:schemeClr val="accent1"/>
+                </a:effectRef>
+                <a:fontRef idx="minor">
+                  <a:schemeClr val="lt1"/>
+                </a:fontRef>
+              </p:style>
+              <p:txBody>
+                <a:bodyPr rtlCol="0" anchor="ctr"/>
+                <a:lstStyle/>
+                <a:p>
+                  <a:pPr algn="ctr"/>
+                  <a:endParaRPr lang="en-US"/>
+                </a:p>
+              </p:txBody>
+            </p:sp>
+            <p:sp>
+              <p:nvSpPr>
+                <p:cNvPr id="11" name="TextBox 10">
+                  <a:extLst>
+                    <a:ext uri="{FF2B5EF4-FFF2-40B4-BE49-F238E27FC236}">
+                      <a16:creationId xmlns:a16="http://schemas.microsoft.com/office/drawing/2014/main" id="{8639E07F-F002-352B-7667-BB6C66425768}"/>
+                    </a:ext>
+                  </a:extLst>
+                </p:cNvPr>
+                <p:cNvSpPr txBox="1"/>
+                <p:nvPr/>
+              </p:nvSpPr>
+              <p:spPr>
+                <a:xfrm>
+                  <a:off x="4737021" y="4021915"/>
+                  <a:ext cx="1580236" cy="307777"/>
+                </a:xfrm>
+                <a:prstGeom prst="rect">
+                  <a:avLst/>
+                </a:prstGeom>
+                <a:solidFill>
+                  <a:schemeClr val="bg1"/>
+                </a:solidFill>
+                <a:ln>
+                  <a:noFill/>
+                </a:ln>
+              </p:spPr>
+              <p:txBody>
+                <a:bodyPr wrap="square" rtlCol="0">
+                  <a:spAutoFit/>
+                </a:bodyPr>
+                <a:lstStyle/>
+                <a:p>
+                  <a:r>
+                    <a:rPr lang="en-US" sz="1400" dirty="0"/>
+                    <a:t>C.  Reptiles</a:t>
+                  </a:r>
+                </a:p>
+              </p:txBody>
+            </p:sp>
+          </p:grpSp>
+          <p:pic>
+            <p:nvPicPr>
+              <p:cNvPr id="7" name="Picture 6" descr="A diagram of different colors and sizes&#10;&#10;Description automatically generated with medium confidence">
+                <a:extLst>
+                  <a:ext uri="{FF2B5EF4-FFF2-40B4-BE49-F238E27FC236}">
+                    <a16:creationId xmlns:a16="http://schemas.microsoft.com/office/drawing/2014/main" id="{850EF3DF-0DB3-5354-D448-21ED68FB50BA}"/>
+                  </a:ext>
+                </a:extLst>
+              </p:cNvPr>
+              <p:cNvPicPr>
+                <a:picLocks noChangeAspect="1"/>
+              </p:cNvPicPr>
+              <p:nvPr/>
+            </p:nvPicPr>
+            <p:blipFill rotWithShape="1">
+              <a:blip r:embed="rId2">
+                <a:extLst>
+                  <a:ext uri="{28A0092B-C50C-407E-A947-70E740481C1C}">
+                    <a14:useLocalDpi xmlns:a14="http://schemas.microsoft.com/office/drawing/2010/main" val="0"/>
+                  </a:ext>
+                </a:extLst>
+              </a:blip>
+              <a:srcRect l="21461" t="72514" r="68666"/>
+              <a:stretch/>
+            </p:blipFill>
+            <p:spPr>
+              <a:xfrm>
+                <a:off x="3777465" y="4183547"/>
+                <a:ext cx="1021010" cy="1831452"/>
+              </a:xfrm>
+              <a:prstGeom prst="rect">
+                <a:avLst/>
+              </a:prstGeom>
+              <a:ln>
+                <a:noFill/>
+              </a:ln>
+            </p:spPr>
+          </p:pic>
+          <p:pic>
+            <p:nvPicPr>
+              <p:cNvPr id="6" name="Picture 5" descr="A diagram of different colors and sizes&#10;&#10;Description automatically generated with medium confidence">
+                <a:extLst>
+                  <a:ext uri="{FF2B5EF4-FFF2-40B4-BE49-F238E27FC236}">
+                    <a16:creationId xmlns:a16="http://schemas.microsoft.com/office/drawing/2014/main" id="{F3018EC0-EA35-A294-92AC-C2179947819A}"/>
+                  </a:ext>
+                </a:extLst>
+              </p:cNvPr>
+              <p:cNvPicPr>
+                <a:picLocks noChangeAspect="1"/>
+              </p:cNvPicPr>
+              <p:nvPr/>
+            </p:nvPicPr>
+            <p:blipFill rotWithShape="1">
+              <a:blip r:embed="rId2">
+                <a:extLst>
+                  <a:ext uri="{28A0092B-C50C-407E-A947-70E740481C1C}">
+                    <a14:useLocalDpi xmlns:a14="http://schemas.microsoft.com/office/drawing/2010/main" val="0"/>
+                  </a:ext>
+                </a:extLst>
+              </a:blip>
+              <a:srcRect l="54884" t="76943" r="35277" b="4309"/>
+              <a:stretch/>
+            </p:blipFill>
+            <p:spPr>
+              <a:xfrm>
+                <a:off x="6349878" y="4411890"/>
+                <a:ext cx="1126964" cy="1342417"/>
+              </a:xfrm>
+              <a:prstGeom prst="rect">
+                <a:avLst/>
+              </a:prstGeom>
+              <a:ln>
+                <a:noFill/>
+              </a:ln>
+            </p:spPr>
+          </p:pic>
+          <p:pic>
+            <p:nvPicPr>
+              <p:cNvPr id="5" name="Picture 4" descr="A diagram of different colors and sizes&#10;&#10;Description automatically generated with medium confidence">
+                <a:extLst>
+                  <a:ext uri="{FF2B5EF4-FFF2-40B4-BE49-F238E27FC236}">
+                    <a16:creationId xmlns:a16="http://schemas.microsoft.com/office/drawing/2014/main" id="{683E0076-8EDD-A266-FE2A-76F7E4E3A65C}"/>
+                  </a:ext>
+                </a:extLst>
+              </p:cNvPr>
+              <p:cNvPicPr>
+                <a:picLocks noChangeAspect="1"/>
+              </p:cNvPicPr>
+              <p:nvPr/>
+            </p:nvPicPr>
+            <p:blipFill rotWithShape="1">
+              <a:blip r:embed="rId2">
+                <a:extLst>
+                  <a:ext uri="{28A0092B-C50C-407E-A947-70E740481C1C}">
+                    <a14:useLocalDpi xmlns:a14="http://schemas.microsoft.com/office/drawing/2010/main" val="0"/>
+                  </a:ext>
+                </a:extLst>
+              </a:blip>
+              <a:srcRect l="89111" t="72397" r="1552" b="2540"/>
+              <a:stretch/>
+            </p:blipFill>
+            <p:spPr>
+              <a:xfrm>
+                <a:off x="9028245" y="4173421"/>
+                <a:ext cx="939136" cy="1575881"/>
+              </a:xfrm>
+              <a:prstGeom prst="rect">
+                <a:avLst/>
+              </a:prstGeom>
+              <a:ln>
+                <a:noFill/>
+              </a:ln>
+            </p:spPr>
+          </p:pic>
+        </p:grpSp>
+        <p:pic>
+          <p:nvPicPr>
+            <p:cNvPr id="8" name="Picture 7" descr="A diagram of different colors and sizes&#10;&#10;Description automatically generated with medium confidence">
+              <a:extLst>
+                <a:ext uri="{FF2B5EF4-FFF2-40B4-BE49-F238E27FC236}">
+                  <a16:creationId xmlns:a16="http://schemas.microsoft.com/office/drawing/2014/main" id="{285A2BB5-29CA-21E0-468F-394B22E87285}"/>
+                </a:ext>
+              </a:extLst>
+            </p:cNvPr>
+            <p:cNvPicPr>
+              <a:picLocks noChangeAspect="1"/>
+            </p:cNvPicPr>
+            <p:nvPr/>
+          </p:nvPicPr>
+          <p:blipFill rotWithShape="1">
+            <a:blip r:embed="rId2">
+              <a:extLst>
+                <a:ext uri="{28A0092B-C50C-407E-A947-70E740481C1C}">
+                  <a14:useLocalDpi xmlns:a14="http://schemas.microsoft.com/office/drawing/2010/main" val="0"/>
+                </a:ext>
+              </a:extLst>
+            </a:blip>
+            <a:srcRect l="65698" t="27429" r="21171" b="53501"/>
+            <a:stretch/>
+          </p:blipFill>
+          <p:spPr>
+            <a:xfrm>
+              <a:off x="6626010" y="2048338"/>
+              <a:ext cx="1833294" cy="1664437"/>
+            </a:xfrm>
+            <a:prstGeom prst="rect">
+              <a:avLst/>
+            </a:prstGeom>
+            <a:ln>
+              <a:noFill/>
+            </a:ln>
+          </p:spPr>
+        </p:pic>
+      </p:grpSp>
+    </p:spTree>
+    <p:extLst>
+      <p:ext uri="{BB962C8B-B14F-4D97-AF65-F5344CB8AC3E}">
+        <p14:creationId xmlns:p14="http://schemas.microsoft.com/office/powerpoint/2010/main" val="599842531"/>
+      </p:ext>
+    </p:extLst>
+  </p:cSld>
+  <p:clrMapOvr>
+    <a:masterClrMapping/>
+  </p:clrMapOvr>
+</p:sld>
+</file>
+
+<file path=ppt/slides/slide5.xml><?xml version="1.0" encoding="utf-8"?>
+<p:sld xmlns:a="http://schemas.openxmlformats.org/drawingml/2006/main" xmlns:r="http://schemas.openxmlformats.org/officeDocument/2006/relationships" xmlns:p="http://schemas.openxmlformats.org/presentationml/2006/main">
+  <p:cSld>
+    <p:spTree>
+      <p:nvGrpSpPr>
+        <p:cNvPr id="1" name=""/>
+        <p:cNvGrpSpPr/>
+        <p:nvPr/>
+      </p:nvGrpSpPr>
+      <p:grpSpPr>
+        <a:xfrm>
+          <a:off x="0" y="0"/>
+          <a:ext cx="0" cy="0"/>
+          <a:chOff x="0" y="0"/>
+          <a:chExt cx="0" cy="0"/>
+        </a:xfrm>
+      </p:grpSpPr>
+      <p:grpSp>
+        <p:nvGrpSpPr>
+          <p:cNvPr id="9" name="Group 8">
+            <a:extLst>
+              <a:ext uri="{FF2B5EF4-FFF2-40B4-BE49-F238E27FC236}">
+                <a16:creationId xmlns:a16="http://schemas.microsoft.com/office/drawing/2014/main" id="{981066B1-FE5F-B52F-17AD-2372816DB078}"/>
+              </a:ext>
+            </a:extLst>
+          </p:cNvPr>
+          <p:cNvGrpSpPr/>
+          <p:nvPr/>
+        </p:nvGrpSpPr>
+        <p:grpSpPr>
+          <a:xfrm>
+            <a:off x="2237338" y="742146"/>
+            <a:ext cx="7552672" cy="4478036"/>
+            <a:chOff x="2237338" y="742146"/>
+            <a:chExt cx="7552672" cy="4478036"/>
+          </a:xfrm>
+        </p:grpSpPr>
+        <p:pic>
+          <p:nvPicPr>
+            <p:cNvPr id="5" name="Picture 4" descr="A graph of a number of colored lines&#10;&#10;Description automatically generated">
+              <a:extLst>
+                <a:ext uri="{FF2B5EF4-FFF2-40B4-BE49-F238E27FC236}">
+                  <a16:creationId xmlns:a16="http://schemas.microsoft.com/office/drawing/2014/main" id="{EAAA20C1-C74A-C6E7-259E-54BE0C7CA9F7}"/>
+                </a:ext>
+              </a:extLst>
+            </p:cNvPr>
+            <p:cNvPicPr>
+              <a:picLocks noChangeAspect="1"/>
+            </p:cNvPicPr>
+            <p:nvPr/>
+          </p:nvPicPr>
+          <p:blipFill rotWithShape="1">
+            <a:blip r:embed="rId2">
+              <a:extLst>
+                <a:ext uri="{28A0092B-C50C-407E-A947-70E740481C1C}">
+                  <a14:useLocalDpi xmlns:a14="http://schemas.microsoft.com/office/drawing/2010/main" val="0"/>
+                </a:ext>
+              </a:extLst>
+            </a:blip>
+            <a:srcRect l="85099" t="30906" b="37571"/>
+            <a:stretch/>
+          </p:blipFill>
+          <p:spPr>
+            <a:xfrm>
+              <a:off x="8197917" y="1554332"/>
+              <a:ext cx="1592093" cy="2431617"/>
+            </a:xfrm>
+            <a:prstGeom prst="rect">
+              <a:avLst/>
+            </a:prstGeom>
+          </p:spPr>
+        </p:pic>
+        <p:pic>
+          <p:nvPicPr>
+            <p:cNvPr id="8" name="Picture 7" descr="A graph of a number of colored lines&#10;&#10;Description automatically generated with medium confidence">
+              <a:extLst>
+                <a:ext uri="{FF2B5EF4-FFF2-40B4-BE49-F238E27FC236}">
+                  <a16:creationId xmlns:a16="http://schemas.microsoft.com/office/drawing/2014/main" id="{8F6D47CC-3196-C807-3EE1-D9E2E6E4855A}"/>
+                </a:ext>
+              </a:extLst>
+            </p:cNvPr>
+            <p:cNvPicPr>
+              <a:picLocks noChangeAspect="1"/>
+            </p:cNvPicPr>
+            <p:nvPr/>
+          </p:nvPicPr>
+          <p:blipFill rotWithShape="1">
+            <a:blip r:embed="rId3"/>
+            <a:srcRect r="15266"/>
+            <a:stretch/>
+          </p:blipFill>
+          <p:spPr>
+            <a:xfrm>
+              <a:off x="2237338" y="742146"/>
+              <a:ext cx="6151759" cy="4478036"/>
+            </a:xfrm>
+            <a:prstGeom prst="rect">
+              <a:avLst/>
+            </a:prstGeom>
+          </p:spPr>
+        </p:pic>
+      </p:grpSp>
+    </p:spTree>
+    <p:extLst>
+      <p:ext uri="{BB962C8B-B14F-4D97-AF65-F5344CB8AC3E}">
+        <p14:creationId xmlns:p14="http://schemas.microsoft.com/office/powerpoint/2010/main" val="1332831297"/>
+      </p:ext>
+    </p:extLst>
+  </p:cSld>
+  <p:clrMapOvr>
+    <a:masterClrMapping/>
+  </p:clrMapOvr>
+</p:sld>
+</file>
+
+<file path=ppt/slides/slide6.xml><?xml version="1.0" encoding="utf-8"?>
+<p:sld xmlns:a="http://schemas.openxmlformats.org/drawingml/2006/main" xmlns:r="http://schemas.openxmlformats.org/officeDocument/2006/relationships" xmlns:p="http://schemas.openxmlformats.org/presentationml/2006/main">
+  <p:cSld>
+    <p:spTree>
+      <p:nvGrpSpPr>
+        <p:cNvPr id="1" name=""/>
+        <p:cNvGrpSpPr/>
+        <p:nvPr/>
+      </p:nvGrpSpPr>
+      <p:grpSpPr>
+        <a:xfrm>
+          <a:off x="0" y="0"/>
+          <a:ext cx="0" cy="0"/>
+          <a:chOff x="0" y="0"/>
+          <a:chExt cx="0" cy="0"/>
+        </a:xfrm>
+      </p:grpSpPr>
+      <p:sp>
+        <p:nvSpPr>
+          <p:cNvPr id="5" name="Rectangle 4">
+            <a:extLst>
+              <a:ext uri="{FF2B5EF4-FFF2-40B4-BE49-F238E27FC236}">
+                <a16:creationId xmlns:a16="http://schemas.microsoft.com/office/drawing/2014/main" id="{F891F6C3-43A8-80DC-DEA0-FA3634AB0A71}"/>
+              </a:ext>
+            </a:extLst>
+          </p:cNvPr>
+          <p:cNvSpPr/>
+          <p:nvPr/>
+        </p:nvSpPr>
+        <p:spPr>
+          <a:xfrm rot="5400000">
+            <a:off x="6544506" y="1294163"/>
+            <a:ext cx="228791" cy="3605841"/>
+          </a:xfrm>
+          <a:prstGeom prst="rect">
+            <a:avLst/>
+          </a:prstGeom>
+          <a:solidFill>
+            <a:schemeClr val="bg1"/>
+          </a:solidFill>
+          <a:ln>
+            <a:noFill/>
+          </a:ln>
+        </p:spPr>
+        <p:style>
+          <a:lnRef idx="2">
+            <a:schemeClr val="accent1">
+              <a:shade val="15000"/>
+            </a:schemeClr>
+          </a:lnRef>
+          <a:fillRef idx="1">
+            <a:schemeClr val="accent1"/>
+          </a:fillRef>
+          <a:effectRef idx="0">
+            <a:schemeClr val="accent1"/>
+          </a:effectRef>
+          <a:fontRef idx="minor">
+            <a:schemeClr val="lt1"/>
+          </a:fontRef>
+        </p:style>
+        <p:txBody>
+          <a:bodyPr rtlCol="0" anchor="ctr"/>
+          <a:lstStyle/>
+          <a:p>
+            <a:pPr algn="ctr"/>
+            <a:endParaRPr lang="en-US" dirty="0"/>
+          </a:p>
+        </p:txBody>
+      </p:sp>
+      <p:grpSp>
+        <p:nvGrpSpPr>
+          <p:cNvPr id="23" name="Group 22">
+            <a:extLst>
+              <a:ext uri="{FF2B5EF4-FFF2-40B4-BE49-F238E27FC236}">
+                <a16:creationId xmlns:a16="http://schemas.microsoft.com/office/drawing/2014/main" id="{93EB0304-DBC3-9E8F-5F96-A191703E5B1A}"/>
+              </a:ext>
+            </a:extLst>
+          </p:cNvPr>
+          <p:cNvGrpSpPr/>
+          <p:nvPr/>
+        </p:nvGrpSpPr>
+        <p:grpSpPr>
+          <a:xfrm>
+            <a:off x="2998120" y="518983"/>
+            <a:ext cx="5463702" cy="5156200"/>
+            <a:chOff x="2770549" y="629555"/>
+            <a:chExt cx="5463702" cy="5156200"/>
+          </a:xfrm>
+        </p:grpSpPr>
+        <p:grpSp>
+          <p:nvGrpSpPr>
+            <p:cNvPr id="12" name="Group 11">
+              <a:extLst>
+                <a:ext uri="{FF2B5EF4-FFF2-40B4-BE49-F238E27FC236}">
+                  <a16:creationId xmlns:a16="http://schemas.microsoft.com/office/drawing/2014/main" id="{54E958D1-4397-26BF-17FD-F79B5EA17DBB}"/>
+                </a:ext>
+              </a:extLst>
+            </p:cNvPr>
+            <p:cNvGrpSpPr/>
+            <p:nvPr/>
+          </p:nvGrpSpPr>
+          <p:grpSpPr>
+            <a:xfrm>
+              <a:off x="3052651" y="629555"/>
+              <a:ext cx="5181600" cy="5156200"/>
+              <a:chOff x="3709481" y="747678"/>
+              <a:chExt cx="5181600" cy="5156200"/>
+            </a:xfrm>
+          </p:grpSpPr>
+          <p:pic>
+            <p:nvPicPr>
+              <p:cNvPr id="9" name="Picture 8" descr="A graph with red dots&#10;&#10;Description automatically generated">
+                <a:extLst>
+                  <a:ext uri="{FF2B5EF4-FFF2-40B4-BE49-F238E27FC236}">
+                    <a16:creationId xmlns:a16="http://schemas.microsoft.com/office/drawing/2014/main" id="{69DDCCC1-497B-1AE3-A917-E3551F11CBAB}"/>
+                  </a:ext>
+                </a:extLst>
+              </p:cNvPr>
+              <p:cNvPicPr>
+                <a:picLocks noChangeAspect="1"/>
+              </p:cNvPicPr>
+              <p:nvPr/>
+            </p:nvPicPr>
+            <p:blipFill>
+              <a:blip r:embed="rId2"/>
+              <a:stretch>
+                <a:fillRect/>
+              </a:stretch>
+            </p:blipFill>
+            <p:spPr>
+              <a:xfrm>
+                <a:off x="3709481" y="747678"/>
+                <a:ext cx="5181600" cy="2463800"/>
+              </a:xfrm>
+              <a:prstGeom prst="rect">
+                <a:avLst/>
+              </a:prstGeom>
+            </p:spPr>
+          </p:pic>
+          <p:pic>
+            <p:nvPicPr>
+              <p:cNvPr id="11" name="Picture 10" descr="A graph with blue dots and black lines&#10;&#10;Description automatically generated">
+                <a:extLst>
+                  <a:ext uri="{FF2B5EF4-FFF2-40B4-BE49-F238E27FC236}">
+                    <a16:creationId xmlns:a16="http://schemas.microsoft.com/office/drawing/2014/main" id="{A4E7C8A4-1D2B-A68D-8E10-C2EA74033610}"/>
+                  </a:ext>
+                </a:extLst>
+              </p:cNvPr>
+              <p:cNvPicPr>
+                <a:picLocks noChangeAspect="1"/>
+              </p:cNvPicPr>
+              <p:nvPr/>
+            </p:nvPicPr>
+            <p:blipFill>
+              <a:blip r:embed="rId3"/>
+              <a:stretch>
+                <a:fillRect/>
+              </a:stretch>
+            </p:blipFill>
+            <p:spPr>
+              <a:xfrm>
+                <a:off x="3709481" y="3211478"/>
+                <a:ext cx="5181600" cy="2692400"/>
+              </a:xfrm>
+              <a:prstGeom prst="rect">
+                <a:avLst/>
+              </a:prstGeom>
+            </p:spPr>
+          </p:pic>
+        </p:grpSp>
+        <p:sp>
+          <p:nvSpPr>
+            <p:cNvPr id="13" name="TextBox 12">
+              <a:extLst>
+                <a:ext uri="{FF2B5EF4-FFF2-40B4-BE49-F238E27FC236}">
+                  <a16:creationId xmlns:a16="http://schemas.microsoft.com/office/drawing/2014/main" id="{34DF7194-19F8-7AB3-9764-4F7FF041DA7D}"/>
+                </a:ext>
+              </a:extLst>
+            </p:cNvPr>
+            <p:cNvSpPr txBox="1"/>
+            <p:nvPr/>
+          </p:nvSpPr>
+          <p:spPr>
+            <a:xfrm>
+              <a:off x="2770549" y="629555"/>
+              <a:ext cx="282102" cy="369332"/>
+            </a:xfrm>
+            <a:prstGeom prst="rect">
+              <a:avLst/>
+            </a:prstGeom>
+            <a:noFill/>
+          </p:spPr>
+          <p:txBody>
+            <a:bodyPr wrap="square" rtlCol="0">
+              <a:spAutoFit/>
+            </a:bodyPr>
+            <a:lstStyle/>
+            <a:p>
+              <a:r>
+                <a:rPr lang="en-US" dirty="0"/>
+                <a:t>A</a:t>
+              </a:r>
+            </a:p>
+          </p:txBody>
+        </p:sp>
+        <p:sp>
+          <p:nvSpPr>
+            <p:cNvPr id="20" name="Rectangle 19">
+              <a:extLst>
+                <a:ext uri="{FF2B5EF4-FFF2-40B4-BE49-F238E27FC236}">
+                  <a16:creationId xmlns:a16="http://schemas.microsoft.com/office/drawing/2014/main" id="{4EAAB140-D2A1-5308-0252-DE6E27C4113A}"/>
+                </a:ext>
+              </a:extLst>
+            </p:cNvPr>
+            <p:cNvSpPr/>
+            <p:nvPr/>
+          </p:nvSpPr>
+          <p:spPr>
+            <a:xfrm rot="5400000">
+              <a:off x="5536703" y="1179767"/>
+              <a:ext cx="228791" cy="3605841"/>
+            </a:xfrm>
+            <a:prstGeom prst="rect">
+              <a:avLst/>
+            </a:prstGeom>
+            <a:solidFill>
+              <a:schemeClr val="bg1"/>
+            </a:solidFill>
+            <a:ln>
+              <a:noFill/>
+            </a:ln>
+          </p:spPr>
+          <p:style>
+            <a:lnRef idx="2">
+              <a:schemeClr val="accent1">
+                <a:shade val="15000"/>
+              </a:schemeClr>
+            </a:lnRef>
+            <a:fillRef idx="1">
+              <a:schemeClr val="accent1"/>
+            </a:fillRef>
+            <a:effectRef idx="0">
+              <a:schemeClr val="accent1"/>
+            </a:effectRef>
+            <a:fontRef idx="minor">
+              <a:schemeClr val="lt1"/>
+            </a:fontRef>
+          </p:style>
+          <p:txBody>
+            <a:bodyPr rtlCol="0" anchor="ctr"/>
+            <a:lstStyle/>
+            <a:p>
+              <a:pPr algn="ctr"/>
+              <a:endParaRPr lang="en-US"/>
+            </a:p>
+          </p:txBody>
+        </p:sp>
+        <p:sp>
+          <p:nvSpPr>
+            <p:cNvPr id="3" name="Rectangle 2">
+              <a:extLst>
+                <a:ext uri="{FF2B5EF4-FFF2-40B4-BE49-F238E27FC236}">
+                  <a16:creationId xmlns:a16="http://schemas.microsoft.com/office/drawing/2014/main" id="{789D9650-3058-6983-E6C4-92BC68249643}"/>
+                </a:ext>
+              </a:extLst>
+            </p:cNvPr>
+            <p:cNvSpPr/>
+            <p:nvPr/>
+          </p:nvSpPr>
+          <p:spPr>
+            <a:xfrm>
+              <a:off x="3110311" y="1290434"/>
+              <a:ext cx="171182" cy="3605841"/>
+            </a:xfrm>
+            <a:prstGeom prst="rect">
+              <a:avLst/>
+            </a:prstGeom>
+            <a:solidFill>
+              <a:schemeClr val="bg1"/>
+            </a:solidFill>
+            <a:ln>
+              <a:noFill/>
+            </a:ln>
+          </p:spPr>
+          <p:style>
+            <a:lnRef idx="2">
+              <a:schemeClr val="accent1">
+                <a:shade val="15000"/>
+              </a:schemeClr>
+            </a:lnRef>
+            <a:fillRef idx="1">
+              <a:schemeClr val="accent1"/>
+            </a:fillRef>
+            <a:effectRef idx="0">
+              <a:schemeClr val="accent1"/>
+            </a:effectRef>
+            <a:fontRef idx="minor">
+              <a:schemeClr val="lt1"/>
+            </a:fontRef>
+          </p:style>
+          <p:txBody>
+            <a:bodyPr rtlCol="0" anchor="ctr"/>
+            <a:lstStyle/>
+            <a:p>
+              <a:pPr algn="ctr"/>
+              <a:endParaRPr lang="en-US"/>
+            </a:p>
+          </p:txBody>
+        </p:sp>
+        <p:sp>
+          <p:nvSpPr>
+            <p:cNvPr id="4" name="TextBox 3">
+              <a:extLst>
+                <a:ext uri="{FF2B5EF4-FFF2-40B4-BE49-F238E27FC236}">
+                  <a16:creationId xmlns:a16="http://schemas.microsoft.com/office/drawing/2014/main" id="{637334BD-93AC-3744-AC32-5AC4C0044BF1}"/>
+                </a:ext>
+              </a:extLst>
+            </p:cNvPr>
+            <p:cNvSpPr txBox="1"/>
+            <p:nvPr/>
+          </p:nvSpPr>
+          <p:spPr>
+            <a:xfrm rot="16200000">
+              <a:off x="2412378" y="3817752"/>
+              <a:ext cx="1561381" cy="307777"/>
+            </a:xfrm>
+            <a:prstGeom prst="rect">
+              <a:avLst/>
+            </a:prstGeom>
+            <a:noFill/>
+          </p:spPr>
+          <p:txBody>
+            <a:bodyPr wrap="square" rtlCol="0">
+              <a:spAutoFit/>
+            </a:bodyPr>
+            <a:lstStyle/>
+            <a:p>
+              <a:r>
+                <a:rPr lang="en-US" sz="1400" dirty="0"/>
+                <a:t>Intercept</a:t>
+              </a:r>
+            </a:p>
+          </p:txBody>
+        </p:sp>
+        <p:sp>
+          <p:nvSpPr>
+            <p:cNvPr id="14" name="TextBox 13">
+              <a:extLst>
+                <a:ext uri="{FF2B5EF4-FFF2-40B4-BE49-F238E27FC236}">
+                  <a16:creationId xmlns:a16="http://schemas.microsoft.com/office/drawing/2014/main" id="{7BCB2028-CFEF-0DD4-EFC7-6900CB61A67B}"/>
+                </a:ext>
+              </a:extLst>
+            </p:cNvPr>
+            <p:cNvSpPr txBox="1"/>
+            <p:nvPr/>
+          </p:nvSpPr>
+          <p:spPr>
+            <a:xfrm>
+              <a:off x="2832158" y="3093355"/>
+              <a:ext cx="282102" cy="369332"/>
+            </a:xfrm>
+            <a:prstGeom prst="rect">
+              <a:avLst/>
+            </a:prstGeom>
+            <a:noFill/>
+          </p:spPr>
+          <p:txBody>
+            <a:bodyPr wrap="square" rtlCol="0">
+              <a:spAutoFit/>
+            </a:bodyPr>
+            <a:lstStyle/>
+            <a:p>
+              <a:r>
+                <a:rPr lang="en-US" dirty="0"/>
+                <a:t>B</a:t>
+              </a:r>
+            </a:p>
+          </p:txBody>
+        </p:sp>
+        <p:sp>
+          <p:nvSpPr>
+            <p:cNvPr id="2" name="TextBox 1">
+              <a:extLst>
+                <a:ext uri="{FF2B5EF4-FFF2-40B4-BE49-F238E27FC236}">
+                  <a16:creationId xmlns:a16="http://schemas.microsoft.com/office/drawing/2014/main" id="{30585A73-698D-64E6-B09D-39C612F88D2C}"/>
+                </a:ext>
+              </a:extLst>
+            </p:cNvPr>
+            <p:cNvSpPr txBox="1"/>
+            <p:nvPr/>
+          </p:nvSpPr>
+          <p:spPr>
+            <a:xfrm rot="16200000">
+              <a:off x="2400174" y="1256357"/>
+              <a:ext cx="1561381" cy="307777"/>
+            </a:xfrm>
+            <a:prstGeom prst="rect">
+              <a:avLst/>
+            </a:prstGeom>
+            <a:noFill/>
+          </p:spPr>
+          <p:txBody>
+            <a:bodyPr wrap="square" rtlCol="0">
+              <a:spAutoFit/>
+            </a:bodyPr>
+            <a:lstStyle/>
+            <a:p>
+              <a:r>
+                <a:rPr lang="en-US" sz="1400" dirty="0"/>
+                <a:t>Intercept</a:t>
+              </a:r>
+            </a:p>
+          </p:txBody>
+        </p:sp>
+        <p:sp>
+          <p:nvSpPr>
+            <p:cNvPr id="6" name="Rectangle 5">
+              <a:extLst>
+                <a:ext uri="{FF2B5EF4-FFF2-40B4-BE49-F238E27FC236}">
+                  <a16:creationId xmlns:a16="http://schemas.microsoft.com/office/drawing/2014/main" id="{726C8C6B-2688-C9B0-61AF-FA635B0928F0}"/>
+                </a:ext>
+              </a:extLst>
+            </p:cNvPr>
+            <p:cNvSpPr/>
+            <p:nvPr/>
+          </p:nvSpPr>
+          <p:spPr>
+            <a:xfrm rot="5400000">
+              <a:off x="6050962" y="3868439"/>
+              <a:ext cx="228791" cy="3605841"/>
+            </a:xfrm>
+            <a:prstGeom prst="rect">
+              <a:avLst/>
+            </a:prstGeom>
+            <a:solidFill>
+              <a:schemeClr val="bg1"/>
+            </a:solidFill>
+            <a:ln>
+              <a:noFill/>
+            </a:ln>
+          </p:spPr>
+          <p:style>
+            <a:lnRef idx="2">
+              <a:schemeClr val="accent1">
+                <a:shade val="15000"/>
+              </a:schemeClr>
+            </a:lnRef>
+            <a:fillRef idx="1">
+              <a:schemeClr val="accent1"/>
+            </a:fillRef>
+            <a:effectRef idx="0">
+              <a:schemeClr val="accent1"/>
+            </a:effectRef>
+            <a:fontRef idx="minor">
+              <a:schemeClr val="lt1"/>
+            </a:fontRef>
+          </p:style>
+          <p:txBody>
+            <a:bodyPr rtlCol="0" anchor="ctr"/>
+            <a:lstStyle/>
+            <a:p>
+              <a:pPr algn="ctr"/>
+              <a:endParaRPr lang="en-US"/>
+            </a:p>
+          </p:txBody>
+        </p:sp>
+        <p:sp>
+          <p:nvSpPr>
+            <p:cNvPr id="7" name="TextBox 6">
+              <a:extLst>
+                <a:ext uri="{FF2B5EF4-FFF2-40B4-BE49-F238E27FC236}">
+                  <a16:creationId xmlns:a16="http://schemas.microsoft.com/office/drawing/2014/main" id="{87EECC55-4226-A458-2E5B-FEC269AE0184}"/>
+                </a:ext>
+              </a:extLst>
+            </p:cNvPr>
+            <p:cNvSpPr txBox="1"/>
+            <p:nvPr/>
+          </p:nvSpPr>
+          <p:spPr>
+            <a:xfrm>
+              <a:off x="5625170" y="2785578"/>
+              <a:ext cx="947058" cy="307777"/>
+            </a:xfrm>
+            <a:prstGeom prst="rect">
+              <a:avLst/>
+            </a:prstGeom>
+            <a:noFill/>
+          </p:spPr>
+          <p:txBody>
+            <a:bodyPr wrap="square" rtlCol="0">
+              <a:spAutoFit/>
+            </a:bodyPr>
+            <a:lstStyle/>
+            <a:p>
+              <a:r>
+                <a:rPr lang="en-US" sz="1400" dirty="0"/>
+                <a:t>0</a:t>
+              </a:r>
+            </a:p>
+          </p:txBody>
+        </p:sp>
+        <p:sp>
+          <p:nvSpPr>
+            <p:cNvPr id="8" name="TextBox 7">
+              <a:extLst>
+                <a:ext uri="{FF2B5EF4-FFF2-40B4-BE49-F238E27FC236}">
+                  <a16:creationId xmlns:a16="http://schemas.microsoft.com/office/drawing/2014/main" id="{1B51E371-E5E6-0EFE-5AC2-E5D0AF796350}"/>
+                </a:ext>
+              </a:extLst>
+            </p:cNvPr>
+            <p:cNvSpPr txBox="1"/>
+            <p:nvPr/>
+          </p:nvSpPr>
+          <p:spPr>
+            <a:xfrm>
+              <a:off x="5625170" y="5477978"/>
+              <a:ext cx="947058" cy="307777"/>
+            </a:xfrm>
+            <a:prstGeom prst="rect">
+              <a:avLst/>
+            </a:prstGeom>
+            <a:noFill/>
+          </p:spPr>
+          <p:txBody>
+            <a:bodyPr wrap="square" rtlCol="0">
+              <a:spAutoFit/>
+            </a:bodyPr>
+            <a:lstStyle/>
+            <a:p>
+              <a:r>
+                <a:rPr lang="en-US" sz="1400" dirty="0"/>
+                <a:t>0</a:t>
+              </a:r>
+            </a:p>
+          </p:txBody>
+        </p:sp>
+        <p:sp>
+          <p:nvSpPr>
+            <p:cNvPr id="10" name="TextBox 9">
+              <a:extLst>
+                <a:ext uri="{FF2B5EF4-FFF2-40B4-BE49-F238E27FC236}">
+                  <a16:creationId xmlns:a16="http://schemas.microsoft.com/office/drawing/2014/main" id="{D2FFF4BA-B32F-D32D-3366-13849A0E15FD}"/>
+                </a:ext>
+              </a:extLst>
+            </p:cNvPr>
+            <p:cNvSpPr txBox="1"/>
+            <p:nvPr/>
+          </p:nvSpPr>
+          <p:spPr>
+            <a:xfrm>
+              <a:off x="6903170" y="2797877"/>
+              <a:ext cx="276038" cy="307777"/>
+            </a:xfrm>
+            <a:prstGeom prst="rect">
+              <a:avLst/>
+            </a:prstGeom>
+            <a:noFill/>
+          </p:spPr>
+          <p:txBody>
+            <a:bodyPr wrap="none" rtlCol="0">
+              <a:spAutoFit/>
+            </a:bodyPr>
+            <a:lstStyle/>
+            <a:p>
+              <a:r>
+                <a:rPr lang="en-US" sz="1400" dirty="0"/>
+                <a:t>2</a:t>
+              </a:r>
+            </a:p>
+          </p:txBody>
+        </p:sp>
+        <p:sp>
+          <p:nvSpPr>
+            <p:cNvPr id="15" name="TextBox 14">
+              <a:extLst>
+                <a:ext uri="{FF2B5EF4-FFF2-40B4-BE49-F238E27FC236}">
+                  <a16:creationId xmlns:a16="http://schemas.microsoft.com/office/drawing/2014/main" id="{4F4F71A6-346C-E71C-2CD6-BE7712C7942A}"/>
+                </a:ext>
+              </a:extLst>
+            </p:cNvPr>
+            <p:cNvSpPr txBox="1"/>
+            <p:nvPr/>
+          </p:nvSpPr>
+          <p:spPr>
+            <a:xfrm>
+              <a:off x="6903170" y="5461877"/>
+              <a:ext cx="276038" cy="307777"/>
+            </a:xfrm>
+            <a:prstGeom prst="rect">
+              <a:avLst/>
+            </a:prstGeom>
+            <a:noFill/>
+          </p:spPr>
+          <p:txBody>
+            <a:bodyPr wrap="none" rtlCol="0">
+              <a:spAutoFit/>
+            </a:bodyPr>
+            <a:lstStyle/>
+            <a:p>
+              <a:r>
+                <a:rPr lang="en-US" sz="1400" dirty="0"/>
+                <a:t>2</a:t>
+              </a:r>
+            </a:p>
+          </p:txBody>
+        </p:sp>
+        <p:sp>
+          <p:nvSpPr>
+            <p:cNvPr id="16" name="TextBox 15">
+              <a:extLst>
+                <a:ext uri="{FF2B5EF4-FFF2-40B4-BE49-F238E27FC236}">
+                  <a16:creationId xmlns:a16="http://schemas.microsoft.com/office/drawing/2014/main" id="{F700B380-2413-13D9-F02D-AED61122B485}"/>
+                </a:ext>
+              </a:extLst>
+            </p:cNvPr>
+            <p:cNvSpPr txBox="1"/>
+            <p:nvPr/>
+          </p:nvSpPr>
+          <p:spPr>
+            <a:xfrm>
+              <a:off x="4311170" y="2797877"/>
+              <a:ext cx="330540" cy="307777"/>
+            </a:xfrm>
+            <a:prstGeom prst="rect">
+              <a:avLst/>
+            </a:prstGeom>
+            <a:noFill/>
+          </p:spPr>
+          <p:txBody>
+            <a:bodyPr wrap="none" rtlCol="0">
+              <a:spAutoFit/>
+            </a:bodyPr>
+            <a:lstStyle/>
+            <a:p>
+              <a:r>
+                <a:rPr lang="en-US" sz="1400" dirty="0"/>
+                <a:t>-2</a:t>
+              </a:r>
+            </a:p>
+          </p:txBody>
+        </p:sp>
+        <p:sp>
+          <p:nvSpPr>
+            <p:cNvPr id="17" name="TextBox 16">
+              <a:extLst>
+                <a:ext uri="{FF2B5EF4-FFF2-40B4-BE49-F238E27FC236}">
+                  <a16:creationId xmlns:a16="http://schemas.microsoft.com/office/drawing/2014/main" id="{887647EF-6FEF-B929-2F67-57B41E7306FD}"/>
+                </a:ext>
+              </a:extLst>
+            </p:cNvPr>
+            <p:cNvSpPr txBox="1"/>
+            <p:nvPr/>
+          </p:nvSpPr>
+          <p:spPr>
+            <a:xfrm>
+              <a:off x="4311170" y="5461877"/>
+              <a:ext cx="330540" cy="307777"/>
+            </a:xfrm>
+            <a:prstGeom prst="rect">
+              <a:avLst/>
+            </a:prstGeom>
+            <a:noFill/>
+          </p:spPr>
+          <p:txBody>
+            <a:bodyPr wrap="none" rtlCol="0">
+              <a:spAutoFit/>
+            </a:bodyPr>
+            <a:lstStyle/>
+            <a:p>
+              <a:r>
+                <a:rPr lang="en-US" sz="1400" dirty="0"/>
+                <a:t>-2</a:t>
+              </a:r>
+            </a:p>
+          </p:txBody>
+        </p:sp>
+      </p:grpSp>
+      <p:sp>
+        <p:nvSpPr>
+          <p:cNvPr id="21" name="Rectangle 20">
+            <a:extLst>
+              <a:ext uri="{FF2B5EF4-FFF2-40B4-BE49-F238E27FC236}">
+                <a16:creationId xmlns:a16="http://schemas.microsoft.com/office/drawing/2014/main" id="{9FA5B581-06CB-A7C1-3F47-EE138E4CF5DB}"/>
+              </a:ext>
+            </a:extLst>
+          </p:cNvPr>
+          <p:cNvSpPr/>
+          <p:nvPr/>
+        </p:nvSpPr>
+        <p:spPr>
+          <a:xfrm rot="5400000">
+            <a:off x="7313695" y="4278312"/>
+            <a:ext cx="228791" cy="3605841"/>
+          </a:xfrm>
+          <a:prstGeom prst="rect">
+            <a:avLst/>
+          </a:prstGeom>
+          <a:solidFill>
+            <a:schemeClr val="bg1"/>
+          </a:solidFill>
+          <a:ln>
+            <a:noFill/>
+          </a:ln>
+        </p:spPr>
+        <p:style>
+          <a:lnRef idx="2">
+            <a:schemeClr val="accent1">
+              <a:shade val="15000"/>
+            </a:schemeClr>
+          </a:lnRef>
+          <a:fillRef idx="1">
+            <a:schemeClr val="accent1"/>
+          </a:fillRef>
+          <a:effectRef idx="0">
+            <a:schemeClr val="accent1"/>
+          </a:effectRef>
+          <a:fontRef idx="minor">
+            <a:schemeClr val="lt1"/>
+          </a:fontRef>
+        </p:style>
+        <p:txBody>
+          <a:bodyPr rtlCol="0" anchor="ctr"/>
+          <a:lstStyle/>
+          <a:p>
+            <a:pPr algn="ctr"/>
+            <a:endParaRPr lang="en-US"/>
+          </a:p>
+        </p:txBody>
+      </p:sp>
+    </p:spTree>
+    <p:extLst>
+      <p:ext uri="{BB962C8B-B14F-4D97-AF65-F5344CB8AC3E}">
+        <p14:creationId xmlns:p14="http://schemas.microsoft.com/office/powerpoint/2010/main" val="860192013"/>
+      </p:ext>
+    </p:extLst>
+  </p:cSld>
+  <p:clrMapOvr>
+    <a:masterClrMapping/>
+  </p:clrMapOvr>
+</p:sld>
+</file>
+
+<file path=ppt/slides/slide7.xml><?xml version="1.0" encoding="utf-8"?>
+<p:sld xmlns:a="http://schemas.openxmlformats.org/drawingml/2006/main" xmlns:r="http://schemas.openxmlformats.org/officeDocument/2006/relationships" xmlns:p="http://schemas.openxmlformats.org/presentationml/2006/main">
+  <p:cSld>
+    <p:spTree>
+      <p:nvGrpSpPr>
+        <p:cNvPr id="1" name=""/>
+        <p:cNvGrpSpPr/>
+        <p:nvPr/>
+      </p:nvGrpSpPr>
+      <p:grpSpPr>
+        <a:xfrm>
+          <a:off x="0" y="0"/>
+          <a:ext cx="0" cy="0"/>
+          <a:chOff x="0" y="0"/>
+          <a:chExt cx="0" cy="0"/>
+        </a:xfrm>
+      </p:grpSpPr>
+      <p:grpSp>
+        <p:nvGrpSpPr>
+          <p:cNvPr id="8" name="Group 7">
+            <a:extLst>
+              <a:ext uri="{FF2B5EF4-FFF2-40B4-BE49-F238E27FC236}">
+                <a16:creationId xmlns:a16="http://schemas.microsoft.com/office/drawing/2014/main" id="{92E3C7D4-BC4B-EF0A-1D79-9A46F258635B}"/>
+              </a:ext>
+            </a:extLst>
+          </p:cNvPr>
+          <p:cNvGrpSpPr/>
+          <p:nvPr/>
+        </p:nvGrpSpPr>
+        <p:grpSpPr>
+          <a:xfrm>
+            <a:off x="1043426" y="1081511"/>
+            <a:ext cx="7931098" cy="3169475"/>
+            <a:chOff x="1043426" y="1081511"/>
+            <a:chExt cx="7931098" cy="3169475"/>
+          </a:xfrm>
+        </p:grpSpPr>
+        <p:pic>
+          <p:nvPicPr>
+            <p:cNvPr id="4" name="Picture 3" descr="A diagram of a pie chart&#10;&#10;Description automatically generated">
+              <a:extLst>
+                <a:ext uri="{FF2B5EF4-FFF2-40B4-BE49-F238E27FC236}">
+                  <a16:creationId xmlns:a16="http://schemas.microsoft.com/office/drawing/2014/main" id="{36278834-5DC4-3806-DDA8-EED46FDC0188}"/>
+                </a:ext>
+              </a:extLst>
+            </p:cNvPr>
+            <p:cNvPicPr>
+              <a:picLocks noChangeAspect="1"/>
+            </p:cNvPicPr>
+            <p:nvPr/>
+          </p:nvPicPr>
+          <p:blipFill rotWithShape="1">
+            <a:blip r:embed="rId2">
+              <a:extLst>
+                <a:ext uri="{28A0092B-C50C-407E-A947-70E740481C1C}">
+                  <a14:useLocalDpi xmlns:a14="http://schemas.microsoft.com/office/drawing/2010/main" val="0"/>
+                </a:ext>
+              </a:extLst>
+            </a:blip>
+            <a:srcRect t="11652"/>
+            <a:stretch/>
+          </p:blipFill>
+          <p:spPr>
+            <a:xfrm>
+              <a:off x="1043426" y="1081511"/>
+              <a:ext cx="7074577" cy="3169475"/>
+            </a:xfrm>
+            <a:prstGeom prst="rect">
+              <a:avLst/>
+            </a:prstGeom>
+          </p:spPr>
+        </p:pic>
+        <p:pic>
+          <p:nvPicPr>
+            <p:cNvPr id="5" name="Picture 4" descr="A graph of a number of colored lines&#10;&#10;Description automatically generated">
+              <a:extLst>
+                <a:ext uri="{FF2B5EF4-FFF2-40B4-BE49-F238E27FC236}">
+                  <a16:creationId xmlns:a16="http://schemas.microsoft.com/office/drawing/2014/main" id="{02A706B3-E7F3-0AA4-C2A0-61A977D05C9E}"/>
+                </a:ext>
+              </a:extLst>
+            </p:cNvPr>
+            <p:cNvPicPr>
+              <a:picLocks noChangeAspect="1"/>
+            </p:cNvPicPr>
+            <p:nvPr/>
+          </p:nvPicPr>
+          <p:blipFill rotWithShape="1">
+            <a:blip r:embed="rId3">
+              <a:extLst>
+                <a:ext uri="{28A0092B-C50C-407E-A947-70E740481C1C}">
+                  <a14:useLocalDpi xmlns:a14="http://schemas.microsoft.com/office/drawing/2010/main" val="0"/>
+                </a:ext>
+              </a:extLst>
+            </a:blip>
+            <a:srcRect l="85099" t="30906" b="37571"/>
+            <a:stretch/>
+          </p:blipFill>
+          <p:spPr>
+            <a:xfrm>
+              <a:off x="7487327" y="1157591"/>
+              <a:ext cx="1487197" cy="2271409"/>
+            </a:xfrm>
+            <a:prstGeom prst="rect">
+              <a:avLst/>
+            </a:prstGeom>
+          </p:spPr>
+        </p:pic>
+        <p:sp>
+          <p:nvSpPr>
+            <p:cNvPr id="6" name="TextBox 5">
+              <a:extLst>
+                <a:ext uri="{FF2B5EF4-FFF2-40B4-BE49-F238E27FC236}">
+                  <a16:creationId xmlns:a16="http://schemas.microsoft.com/office/drawing/2014/main" id="{6AE5CF8C-1DE7-F65D-B10B-87DA04D3570B}"/>
+                </a:ext>
+              </a:extLst>
+            </p:cNvPr>
+            <p:cNvSpPr txBox="1"/>
+            <p:nvPr/>
+          </p:nvSpPr>
+          <p:spPr>
+            <a:xfrm>
+              <a:off x="1043426" y="1081511"/>
+              <a:ext cx="282102" cy="369332"/>
+            </a:xfrm>
+            <a:prstGeom prst="rect">
+              <a:avLst/>
+            </a:prstGeom>
+            <a:noFill/>
+          </p:spPr>
+          <p:txBody>
+            <a:bodyPr wrap="square" rtlCol="0">
+              <a:spAutoFit/>
+            </a:bodyPr>
+            <a:lstStyle/>
+            <a:p>
+              <a:r>
+                <a:rPr lang="en-US" dirty="0"/>
+                <a:t>A</a:t>
+              </a:r>
+            </a:p>
+          </p:txBody>
+        </p:sp>
+        <p:sp>
+          <p:nvSpPr>
+            <p:cNvPr id="7" name="TextBox 6">
+              <a:extLst>
+                <a:ext uri="{FF2B5EF4-FFF2-40B4-BE49-F238E27FC236}">
+                  <a16:creationId xmlns:a16="http://schemas.microsoft.com/office/drawing/2014/main" id="{5D93A150-B5A6-84F0-F46F-920D7184A47D}"/>
+                </a:ext>
+              </a:extLst>
+            </p:cNvPr>
+            <p:cNvSpPr txBox="1"/>
+            <p:nvPr/>
+          </p:nvSpPr>
+          <p:spPr>
+            <a:xfrm>
+              <a:off x="4439663" y="1081511"/>
+              <a:ext cx="282102" cy="369332"/>
+            </a:xfrm>
+            <a:prstGeom prst="rect">
+              <a:avLst/>
+            </a:prstGeom>
+            <a:noFill/>
+          </p:spPr>
+          <p:txBody>
+            <a:bodyPr wrap="square" rtlCol="0">
+              <a:spAutoFit/>
+            </a:bodyPr>
+            <a:lstStyle/>
+            <a:p>
+              <a:r>
+                <a:rPr lang="en-US" dirty="0"/>
+                <a:t>B</a:t>
+              </a:r>
+            </a:p>
+          </p:txBody>
+        </p:sp>
+      </p:grpSp>
+      <p:grpSp>
+        <p:nvGrpSpPr>
+          <p:cNvPr id="9" name="Group 8">
+            <a:extLst>
+              <a:ext uri="{FF2B5EF4-FFF2-40B4-BE49-F238E27FC236}">
+                <a16:creationId xmlns:a16="http://schemas.microsoft.com/office/drawing/2014/main" id="{5012CD2B-6FCD-20E7-F364-D269361992AF}"/>
+              </a:ext>
+            </a:extLst>
+          </p:cNvPr>
+          <p:cNvGrpSpPr/>
+          <p:nvPr/>
+        </p:nvGrpSpPr>
+        <p:grpSpPr>
+          <a:xfrm>
+            <a:off x="1082337" y="1091238"/>
+            <a:ext cx="7931098" cy="3169475"/>
+            <a:chOff x="1043426" y="1081511"/>
+            <a:chExt cx="7931098" cy="3169475"/>
+          </a:xfrm>
+        </p:grpSpPr>
+        <p:pic>
+          <p:nvPicPr>
+            <p:cNvPr id="10" name="Picture 9" descr="A diagram of a pie chart&#10;&#10;Description automatically generated">
+              <a:extLst>
+                <a:ext uri="{FF2B5EF4-FFF2-40B4-BE49-F238E27FC236}">
+                  <a16:creationId xmlns:a16="http://schemas.microsoft.com/office/drawing/2014/main" id="{E8B6D93E-2F63-D65C-CD42-6E0B5F1DA1FA}"/>
+                </a:ext>
+              </a:extLst>
+            </p:cNvPr>
+            <p:cNvPicPr>
+              <a:picLocks noChangeAspect="1"/>
+            </p:cNvPicPr>
+            <p:nvPr/>
+          </p:nvPicPr>
+          <p:blipFill rotWithShape="1">
+            <a:blip r:embed="rId2">
+              <a:extLst>
+                <a:ext uri="{28A0092B-C50C-407E-A947-70E740481C1C}">
+                  <a14:useLocalDpi xmlns:a14="http://schemas.microsoft.com/office/drawing/2010/main" val="0"/>
+                </a:ext>
+              </a:extLst>
+            </a:blip>
+            <a:srcRect t="11652"/>
+            <a:stretch/>
+          </p:blipFill>
+          <p:spPr>
+            <a:xfrm>
+              <a:off x="1043426" y="1081511"/>
+              <a:ext cx="7074577" cy="3169475"/>
+            </a:xfrm>
+            <a:prstGeom prst="rect">
+              <a:avLst/>
+            </a:prstGeom>
+          </p:spPr>
+        </p:pic>
+        <p:pic>
+          <p:nvPicPr>
+            <p:cNvPr id="11" name="Picture 10" descr="A graph of a number of colored lines&#10;&#10;Description automatically generated">
+              <a:extLst>
+                <a:ext uri="{FF2B5EF4-FFF2-40B4-BE49-F238E27FC236}">
+                  <a16:creationId xmlns:a16="http://schemas.microsoft.com/office/drawing/2014/main" id="{711473B1-9D61-ED25-158F-E18B07B736BD}"/>
+                </a:ext>
+              </a:extLst>
+            </p:cNvPr>
+            <p:cNvPicPr>
+              <a:picLocks noChangeAspect="1"/>
+            </p:cNvPicPr>
+            <p:nvPr/>
+          </p:nvPicPr>
+          <p:blipFill rotWithShape="1">
+            <a:blip r:embed="rId3">
+              <a:extLst>
+                <a:ext uri="{28A0092B-C50C-407E-A947-70E740481C1C}">
+                  <a14:useLocalDpi xmlns:a14="http://schemas.microsoft.com/office/drawing/2010/main" val="0"/>
+                </a:ext>
+              </a:extLst>
+            </a:blip>
+            <a:srcRect l="85099" t="30906" b="37571"/>
+            <a:stretch/>
+          </p:blipFill>
+          <p:spPr>
+            <a:xfrm>
+              <a:off x="7487327" y="1157591"/>
+              <a:ext cx="1487197" cy="2271409"/>
+            </a:xfrm>
+            <a:prstGeom prst="rect">
+              <a:avLst/>
+            </a:prstGeom>
+          </p:spPr>
+        </p:pic>
+        <p:sp>
+          <p:nvSpPr>
+            <p:cNvPr id="12" name="TextBox 11">
+              <a:extLst>
+                <a:ext uri="{FF2B5EF4-FFF2-40B4-BE49-F238E27FC236}">
+                  <a16:creationId xmlns:a16="http://schemas.microsoft.com/office/drawing/2014/main" id="{E8C04856-3895-EEDC-2869-5ADDF45746A9}"/>
+                </a:ext>
+              </a:extLst>
+            </p:cNvPr>
+            <p:cNvSpPr txBox="1"/>
+            <p:nvPr/>
+          </p:nvSpPr>
+          <p:spPr>
+            <a:xfrm>
+              <a:off x="1043426" y="1081511"/>
+              <a:ext cx="282102" cy="369332"/>
+            </a:xfrm>
+            <a:prstGeom prst="rect">
+              <a:avLst/>
+            </a:prstGeom>
+            <a:noFill/>
+          </p:spPr>
+          <p:txBody>
+            <a:bodyPr wrap="square" rtlCol="0">
+              <a:spAutoFit/>
+            </a:bodyPr>
+            <a:lstStyle/>
+            <a:p>
+              <a:r>
+                <a:rPr lang="en-US" dirty="0"/>
+                <a:t>A</a:t>
+              </a:r>
+            </a:p>
+          </p:txBody>
+        </p:sp>
+        <p:sp>
+          <p:nvSpPr>
+            <p:cNvPr id="13" name="TextBox 12">
+              <a:extLst>
+                <a:ext uri="{FF2B5EF4-FFF2-40B4-BE49-F238E27FC236}">
+                  <a16:creationId xmlns:a16="http://schemas.microsoft.com/office/drawing/2014/main" id="{1F43AEF0-1F49-750C-7C66-F9D584BBAD3D}"/>
+                </a:ext>
+              </a:extLst>
+            </p:cNvPr>
+            <p:cNvSpPr txBox="1"/>
+            <p:nvPr/>
+          </p:nvSpPr>
+          <p:spPr>
+            <a:xfrm>
+              <a:off x="4439663" y="1081511"/>
+              <a:ext cx="282102" cy="369332"/>
+            </a:xfrm>
+            <a:prstGeom prst="rect">
+              <a:avLst/>
+            </a:prstGeom>
+            <a:noFill/>
+          </p:spPr>
+          <p:txBody>
+            <a:bodyPr wrap="square" rtlCol="0">
+              <a:spAutoFit/>
+            </a:bodyPr>
+            <a:lstStyle/>
+            <a:p>
+              <a:r>
+                <a:rPr lang="en-US" dirty="0"/>
+                <a:t>B</a:t>
+              </a:r>
+            </a:p>
+          </p:txBody>
+        </p:sp>
+      </p:grpSp>
+    </p:spTree>
+    <p:extLst>
+      <p:ext uri="{BB962C8B-B14F-4D97-AF65-F5344CB8AC3E}">
+        <p14:creationId xmlns:p14="http://schemas.microsoft.com/office/powerpoint/2010/main" val="675637105"/>
+      </p:ext>
+    </p:extLst>
+  </p:cSld>
+  <p:clrMapOvr>
+    <a:masterClrMapping/>
+  </p:clrMapOvr>
+</p:sld>
+</file>
+
+<file path=ppt/slides/slide8.xml><?xml version="1.0" encoding="utf-8"?>
+<p:sld xmlns:a="http://schemas.openxmlformats.org/drawingml/2006/main" xmlns:r="http://schemas.openxmlformats.org/officeDocument/2006/relationships" xmlns:p="http://schemas.openxmlformats.org/presentationml/2006/main">
+  <p:cSld>
+    <p:spTree>
+      <p:nvGrpSpPr>
+        <p:cNvPr id="1" name=""/>
+        <p:cNvGrpSpPr/>
+        <p:nvPr/>
+      </p:nvGrpSpPr>
+      <p:grpSpPr>
+        <a:xfrm>
+          <a:off x="0" y="0"/>
+          <a:ext cx="0" cy="0"/>
+          <a:chOff x="0" y="0"/>
+          <a:chExt cx="0" cy="0"/>
+        </a:xfrm>
+      </p:grpSpPr>
+      <p:grpSp>
+        <p:nvGrpSpPr>
+          <p:cNvPr id="5" name="Group 4">
+            <a:extLst>
+              <a:ext uri="{FF2B5EF4-FFF2-40B4-BE49-F238E27FC236}">
+                <a16:creationId xmlns:a16="http://schemas.microsoft.com/office/drawing/2014/main" id="{9FCC0096-22AF-FE4C-B30D-D56240FF6116}"/>
+              </a:ext>
+            </a:extLst>
+          </p:cNvPr>
+          <p:cNvGrpSpPr/>
+          <p:nvPr/>
+        </p:nvGrpSpPr>
+        <p:grpSpPr>
+          <a:xfrm>
+            <a:off x="865414" y="693574"/>
+            <a:ext cx="9993086" cy="6317285"/>
+            <a:chOff x="865414" y="693574"/>
+            <a:chExt cx="9993086" cy="6317285"/>
+          </a:xfrm>
+        </p:grpSpPr>
+        <p:pic>
+          <p:nvPicPr>
+            <p:cNvPr id="3" name="Picture 2" descr="A diagram of a pie chart&#10;&#10;Description automatically generated">
+              <a:extLst>
+                <a:ext uri="{FF2B5EF4-FFF2-40B4-BE49-F238E27FC236}">
+                  <a16:creationId xmlns:a16="http://schemas.microsoft.com/office/drawing/2014/main" id="{7BF415A5-592E-8429-5AAE-1789BC5E05FB}"/>
+                </a:ext>
+              </a:extLst>
+            </p:cNvPr>
+            <p:cNvPicPr>
+              <a:picLocks noChangeAspect="1"/>
+            </p:cNvPicPr>
+            <p:nvPr/>
+          </p:nvPicPr>
+          <p:blipFill rotWithShape="1">
+            <a:blip r:embed="rId2">
+              <a:extLst>
+                <a:ext uri="{28A0092B-C50C-407E-A947-70E740481C1C}">
+                  <a14:useLocalDpi xmlns:a14="http://schemas.microsoft.com/office/drawing/2010/main" val="0"/>
+                </a:ext>
+              </a:extLst>
+            </a:blip>
+            <a:srcRect l="-2422" t="5965" r="5405" b="-5252"/>
+            <a:stretch/>
+          </p:blipFill>
+          <p:spPr>
+            <a:xfrm>
+              <a:off x="865414" y="693574"/>
+              <a:ext cx="9993086" cy="6317285"/>
+            </a:xfrm>
+            <a:prstGeom prst="rect">
+              <a:avLst/>
+            </a:prstGeom>
+          </p:spPr>
+        </p:pic>
+        <p:pic>
+          <p:nvPicPr>
+            <p:cNvPr id="2" name="Picture 1" descr="A diagram of a pie chart&#10;&#10;Description automatically generated">
+              <a:extLst>
+                <a:ext uri="{FF2B5EF4-FFF2-40B4-BE49-F238E27FC236}">
+                  <a16:creationId xmlns:a16="http://schemas.microsoft.com/office/drawing/2014/main" id="{97016219-B272-9775-EBCD-76E51CA6D79B}"/>
+                </a:ext>
+              </a:extLst>
+            </p:cNvPr>
+            <p:cNvPicPr>
+              <a:picLocks noChangeAspect="1"/>
+            </p:cNvPicPr>
+            <p:nvPr/>
+          </p:nvPicPr>
+          <p:blipFill rotWithShape="1">
+            <a:blip r:embed="rId2">
+              <a:extLst>
+                <a:ext uri="{28A0092B-C50C-407E-A947-70E740481C1C}">
+                  <a14:useLocalDpi xmlns:a14="http://schemas.microsoft.com/office/drawing/2010/main" val="0"/>
+                </a:ext>
+              </a:extLst>
+            </a:blip>
+            <a:srcRect l="62341" t="14178" r="22481" b="46218"/>
+            <a:stretch/>
+          </p:blipFill>
+          <p:spPr>
+            <a:xfrm>
+              <a:off x="7283011" y="881353"/>
+              <a:ext cx="2105919" cy="3394409"/>
+            </a:xfrm>
+            <a:prstGeom prst="rect">
+              <a:avLst/>
+            </a:prstGeom>
+          </p:spPr>
+        </p:pic>
+        <p:sp>
+          <p:nvSpPr>
+            <p:cNvPr id="4" name="TextBox 3">
+              <a:extLst>
+                <a:ext uri="{FF2B5EF4-FFF2-40B4-BE49-F238E27FC236}">
+                  <a16:creationId xmlns:a16="http://schemas.microsoft.com/office/drawing/2014/main" id="{DE4FF61B-CD3B-CDAA-0792-C5F73BAB4E8B}"/>
+                </a:ext>
+              </a:extLst>
+            </p:cNvPr>
+            <p:cNvSpPr txBox="1"/>
+            <p:nvPr/>
+          </p:nvSpPr>
+          <p:spPr>
+            <a:xfrm>
+              <a:off x="2498271" y="693574"/>
+              <a:ext cx="4397829" cy="375557"/>
+            </a:xfrm>
+            <a:prstGeom prst="rect">
+              <a:avLst/>
+            </a:prstGeom>
+            <a:noFill/>
+          </p:spPr>
+          <p:txBody>
+            <a:bodyPr wrap="square" rtlCol="0">
+              <a:spAutoFit/>
+            </a:bodyPr>
+            <a:lstStyle/>
+            <a:p>
+              <a:r>
+                <a:rPr lang="en-US" b="1" dirty="0"/>
+                <a:t>A</a:t>
+              </a:r>
+              <a:r>
+                <a:rPr lang="en-US" dirty="0"/>
+                <a:t>.            Ectotherms</a:t>
+              </a:r>
+            </a:p>
+          </p:txBody>
+        </p:sp>
+      </p:grpSp>
+    </p:spTree>
+    <p:extLst>
+      <p:ext uri="{BB962C8B-B14F-4D97-AF65-F5344CB8AC3E}">
+        <p14:creationId xmlns:p14="http://schemas.microsoft.com/office/powerpoint/2010/main" val="1829195352"/>
       </p:ext>
     </p:extLst>
   </p:cSld>

</xml_diff>